<commit_message>
Add wot application Manager video and new slides.
</commit_message>
<xml_diff>
--- a/docs/developers/WoT Application Manager.pptx
+++ b/docs/developers/WoT Application Manager.pptx
@@ -5,16 +5,18 @@
     <p:sldMasterId id="2147483648" r:id="rId1"/>
   </p:sldMasterIdLst>
   <p:notesMasterIdLst>
-    <p:notesMasterId r:id="rId9"/>
+    <p:notesMasterId r:id="rId11"/>
   </p:notesMasterIdLst>
   <p:sldIdLst>
     <p:sldId id="256" r:id="rId2"/>
-    <p:sldId id="257" r:id="rId3"/>
-    <p:sldId id="258" r:id="rId4"/>
-    <p:sldId id="259" r:id="rId5"/>
-    <p:sldId id="260" r:id="rId6"/>
-    <p:sldId id="262" r:id="rId7"/>
-    <p:sldId id="263" r:id="rId8"/>
+    <p:sldId id="264" r:id="rId3"/>
+    <p:sldId id="257" r:id="rId4"/>
+    <p:sldId id="258" r:id="rId5"/>
+    <p:sldId id="259" r:id="rId6"/>
+    <p:sldId id="260" r:id="rId7"/>
+    <p:sldId id="262" r:id="rId8"/>
+    <p:sldId id="263" r:id="rId9"/>
+    <p:sldId id="265" r:id="rId10"/>
   </p:sldIdLst>
   <p:sldSz cx="12192000" cy="6858000"/>
   <p:notesSz cx="6858000" cy="9144000"/>
@@ -214,7 +216,7 @@
           <a:p>
             <a:fld id="{8389B5DD-0274-BF45-B4C5-62E173E8F634}" type="datetimeFigureOut">
               <a:rPr lang="en-US" smtClean="0"/>
-              <a:t>7/22/2020</a:t>
+              <a:t>9/2/2020</a:t>
             </a:fld>
             <a:endParaRPr lang="en-US"/>
           </a:p>
@@ -838,7 +840,7 @@
           <a:p>
             <a:fld id="{2F93E591-CC8D-C74E-8EED-098A7FB5E64D}" type="datetime1">
               <a:rPr lang="en-CA" smtClean="0"/>
-              <a:t>2020-07-22</a:t>
+              <a:t>2020-09-02</a:t>
             </a:fld>
             <a:endParaRPr lang="en-US"/>
           </a:p>
@@ -1114,7 +1116,7 @@
           <a:p>
             <a:fld id="{2E1BC118-574D-594E-ABEA-A7C82666C9AB}" type="datetime1">
               <a:rPr lang="en-CA" smtClean="0"/>
-              <a:t>2020-07-22</a:t>
+              <a:t>2020-09-02</a:t>
             </a:fld>
             <a:endParaRPr lang="en-US"/>
           </a:p>
@@ -1458,7 +1460,7 @@
           <a:p>
             <a:fld id="{B929AB1E-7FD9-0A40-B7C0-508CCACB3E9A}" type="datetime1">
               <a:rPr lang="en-CA" smtClean="0"/>
-              <a:t>2020-07-22</a:t>
+              <a:t>2020-09-02</a:t>
             </a:fld>
             <a:endParaRPr lang="en-US"/>
           </a:p>
@@ -1727,7 +1729,7 @@
           <a:p>
             <a:fld id="{5AE8723F-57EA-4C47-97B9-92AFDEEF85DC}" type="datetime1">
               <a:rPr lang="en-CA" smtClean="0"/>
-              <a:t>2020-07-22</a:t>
+              <a:t>2020-09-02</a:t>
             </a:fld>
             <a:endParaRPr lang="en-US"/>
           </a:p>
@@ -2066,7 +2068,7 @@
           <a:p>
             <a:fld id="{B2B00E5D-EC04-AA49-8D52-0FCB6E08F63D}" type="datetime1">
               <a:rPr lang="en-CA" smtClean="0"/>
-              <a:t>2020-07-22</a:t>
+              <a:t>2020-09-02</a:t>
             </a:fld>
             <a:endParaRPr lang="en-US"/>
           </a:p>
@@ -2547,7 +2549,7 @@
           <a:p>
             <a:fld id="{FF90905C-10FF-8047-AA7E-6DC7E8B6AF51}" type="datetime1">
               <a:rPr lang="en-CA" smtClean="0"/>
-              <a:t>2020-07-22</a:t>
+              <a:t>2020-09-02</a:t>
             </a:fld>
             <a:endParaRPr lang="en-US"/>
           </a:p>
@@ -2760,7 +2762,7 @@
           <a:p>
             <a:fld id="{D1CE86E2-4400-D342-BEEC-F9C1ADF6F9F7}" type="datetime1">
               <a:rPr lang="en-CA" smtClean="0"/>
-              <a:t>2020-07-22</a:t>
+              <a:t>2020-09-02</a:t>
             </a:fld>
             <a:endParaRPr lang="en-US"/>
           </a:p>
@@ -2936,7 +2938,7 @@
           <a:p>
             <a:fld id="{74358A08-7221-7F45-8378-69D5559861DD}" type="datetime1">
               <a:rPr lang="en-CA" smtClean="0"/>
-              <a:t>2020-07-22</a:t>
+              <a:t>2020-09-02</a:t>
             </a:fld>
             <a:endParaRPr lang="en-US"/>
           </a:p>
@@ -3315,7 +3317,7 @@
           <a:p>
             <a:fld id="{08C20FDB-303D-8A4E-83B7-226DD88B97BD}" type="datetime1">
               <a:rPr lang="en-CA" smtClean="0"/>
-              <a:t>2020-07-22</a:t>
+              <a:t>2020-09-02</a:t>
             </a:fld>
             <a:endParaRPr lang="en-US"/>
           </a:p>
@@ -3674,7 +3676,7 @@
           <a:p>
             <a:fld id="{0A9EBA37-9D18-D34A-A88D-1B00AA06E95C}" type="datetime1">
               <a:rPr lang="en-CA" smtClean="0"/>
-              <a:t>2020-07-22</a:t>
+              <a:t>2020-09-02</a:t>
             </a:fld>
             <a:endParaRPr lang="en-US"/>
           </a:p>
@@ -4021,7 +4023,7 @@
             <a:fld id="{B73A2E78-F38A-E046-ACDB-668F070D1EF6}" type="datetime1">
               <a:rPr lang="en-CA" smtClean="0"/>
               <a:pPr/>
-              <a:t>2020-07-22</a:t>
+              <a:t>2020-09-02</a:t>
             </a:fld>
             <a:endParaRPr lang="en-US" dirty="0"/>
           </a:p>
@@ -4423,23 +4425,21 @@
           <a:p>
             <a:r>
               <a:rPr lang="it-IT" dirty="0"/>
-              <a:t>W</a:t>
-            </a:r>
-            <a:r>
-              <a:rPr lang="en-US" dirty="0" err="1"/>
-              <a:t>oT</a:t>
-            </a:r>
-            <a:r>
-              <a:rPr lang="en-US" dirty="0"/>
-              <a:t> Application Manager</a:t>
-            </a:r>
-            <a:br>
-              <a:rPr lang="en-US" dirty="0"/>
-            </a:br>
-            <a:r>
-              <a:rPr lang="en-US" dirty="0"/>
-              <a:t>and TD-code</a:t>
-            </a:r>
+              <a:t>Building a Web of </a:t>
+            </a:r>
+            <a:r>
+              <a:rPr lang="it-IT" dirty="0" err="1"/>
+              <a:t>Things</a:t>
+            </a:r>
+            <a:r>
+              <a:rPr lang="it-IT" dirty="0"/>
+              <a:t> </a:t>
+            </a:r>
+            <a:r>
+              <a:rPr lang="it-IT" dirty="0" err="1"/>
+              <a:t>application</a:t>
+            </a:r>
+            <a:endParaRPr lang="en-US" dirty="0"/>
           </a:p>
         </p:txBody>
       </p:sp>
@@ -4459,22 +4459,36 @@
             <p:ph type="subTitle" idx="1"/>
           </p:nvPr>
         </p:nvSpPr>
-        <p:spPr/>
-        <p:txBody>
-          <a:bodyPr/>
-          <a:lstStyle/>
+        <p:spPr>
+          <a:xfrm>
+            <a:off x="1523999" y="4707079"/>
+            <a:ext cx="9144000" cy="1179317"/>
+          </a:xfrm>
+        </p:spPr>
+        <p:txBody>
+          <a:bodyPr>
+            <a:normAutofit fontScale="92500" lnSpcReduction="20000"/>
+          </a:bodyPr>
+          <a:lstStyle/>
+          <a:p>
+            <a:r>
+              <a:rPr lang="en-US" sz="3000" b="1" dirty="0" err="1"/>
+              <a:t>WoT</a:t>
+            </a:r>
+            <a:r>
+              <a:rPr lang="en-US" sz="3000" b="1" dirty="0"/>
+              <a:t> application Manager and TD-code </a:t>
+            </a:r>
+          </a:p>
+          <a:p>
+            <a:endParaRPr lang="en-US" dirty="0"/>
+          </a:p>
           <a:p>
             <a:r>
               <a:rPr lang="en-US" dirty="0"/>
               <a:t>Cristiano Aguzzi</a:t>
             </a:r>
           </a:p>
-          <a:p>
-            <a:r>
-              <a:rPr lang="en-US" dirty="0"/>
-              <a:t>22/07/2020</a:t>
-            </a:r>
-          </a:p>
         </p:txBody>
       </p:sp>
       <p:sp>
@@ -4502,6 +4516,151 @@
               <a:rPr lang="en-US"/>
               <a:t>W3C Web of Things (WoT) WG/IG</a:t>
             </a:r>
+          </a:p>
+        </p:txBody>
+      </p:sp>
+      <p:pic>
+        <p:nvPicPr>
+          <p:cNvPr id="6" name="Immagine 5">
+            <a:extLst>
+              <a:ext uri="{FF2B5EF4-FFF2-40B4-BE49-F238E27FC236}">
+                <a16:creationId xmlns:a16="http://schemas.microsoft.com/office/drawing/2014/main" id="{3A5A0D76-1B4F-4C9E-A7C7-A29608F3E1FB}"/>
+              </a:ext>
+            </a:extLst>
+          </p:cNvPr>
+          <p:cNvPicPr>
+            <a:picLocks noChangeAspect="1"/>
+          </p:cNvPicPr>
+          <p:nvPr/>
+        </p:nvPicPr>
+        <p:blipFill>
+          <a:blip r:embed="rId2">
+            <a:extLst>
+              <a:ext uri="{837473B0-CC2E-450A-ABE3-18F120FF3D39}">
+                <a1611:picAttrSrcUrl xmlns:a1611="http://schemas.microsoft.com/office/drawing/2016/11/main" r:id="rId3"/>
+              </a:ext>
+            </a:extLst>
+          </a:blip>
+          <a:stretch>
+            <a:fillRect/>
+          </a:stretch>
+        </p:blipFill>
+        <p:spPr>
+          <a:xfrm>
+            <a:off x="4496672" y="5875944"/>
+            <a:ext cx="337802" cy="337802"/>
+          </a:xfrm>
+          <a:prstGeom prst="rect">
+            <a:avLst/>
+          </a:prstGeom>
+        </p:spPr>
+      </p:pic>
+      <p:pic>
+        <p:nvPicPr>
+          <p:cNvPr id="9" name="Immagine 8" descr="Immagine che contiene ascia&#10;&#10;Descrizione generata automaticamente">
+            <a:extLst>
+              <a:ext uri="{FF2B5EF4-FFF2-40B4-BE49-F238E27FC236}">
+                <a16:creationId xmlns:a16="http://schemas.microsoft.com/office/drawing/2014/main" id="{F60A3741-BDFF-44B9-B80A-701B2A23A152}"/>
+              </a:ext>
+            </a:extLst>
+          </p:cNvPr>
+          <p:cNvPicPr>
+            <a:picLocks noChangeAspect="1"/>
+          </p:cNvPicPr>
+          <p:nvPr/>
+        </p:nvPicPr>
+        <p:blipFill>
+          <a:blip r:embed="rId4">
+            <a:biLevel thresh="75000"/>
+            <a:extLst>
+              <a:ext uri="{837473B0-CC2E-450A-ABE3-18F120FF3D39}">
+                <a1611:picAttrSrcUrl xmlns:a1611="http://schemas.microsoft.com/office/drawing/2016/11/main" r:id="rId5"/>
+              </a:ext>
+            </a:extLst>
+          </a:blip>
+          <a:stretch>
+            <a:fillRect/>
+          </a:stretch>
+        </p:blipFill>
+        <p:spPr>
+          <a:xfrm>
+            <a:off x="6693389" y="5901105"/>
+            <a:ext cx="324400" cy="262224"/>
+          </a:xfrm>
+          <a:prstGeom prst="rect">
+            <a:avLst/>
+          </a:prstGeom>
+        </p:spPr>
+      </p:pic>
+      <p:sp>
+        <p:nvSpPr>
+          <p:cNvPr id="11" name="CasellaDiTesto 10">
+            <a:extLst>
+              <a:ext uri="{FF2B5EF4-FFF2-40B4-BE49-F238E27FC236}">
+                <a16:creationId xmlns:a16="http://schemas.microsoft.com/office/drawing/2014/main" id="{94580E10-B456-431C-AE52-D8C313FE8209}"/>
+              </a:ext>
+            </a:extLst>
+          </p:cNvPr>
+          <p:cNvSpPr txBox="1"/>
+          <p:nvPr/>
+        </p:nvSpPr>
+        <p:spPr>
+          <a:xfrm>
+            <a:off x="4834474" y="5862940"/>
+            <a:ext cx="1167257" cy="338554"/>
+          </a:xfrm>
+          <a:prstGeom prst="rect">
+            <a:avLst/>
+          </a:prstGeom>
+          <a:noFill/>
+        </p:spPr>
+        <p:txBody>
+          <a:bodyPr wrap="square" rtlCol="0">
+            <a:spAutoFit/>
+          </a:bodyPr>
+          <a:lstStyle/>
+          <a:p>
+            <a:r>
+              <a:rPr lang="it-IT" sz="1600" dirty="0"/>
+              <a:t>@relu91</a:t>
+            </a:r>
+            <a:endParaRPr lang="en-US" sz="1600" dirty="0"/>
+          </a:p>
+        </p:txBody>
+      </p:sp>
+      <p:sp>
+        <p:nvSpPr>
+          <p:cNvPr id="12" name="CasellaDiTesto 11">
+            <a:extLst>
+              <a:ext uri="{FF2B5EF4-FFF2-40B4-BE49-F238E27FC236}">
+                <a16:creationId xmlns:a16="http://schemas.microsoft.com/office/drawing/2014/main" id="{D2F9C7F8-7AF5-4BA0-B6FA-4A48FB65D6AD}"/>
+              </a:ext>
+            </a:extLst>
+          </p:cNvPr>
+          <p:cNvSpPr txBox="1"/>
+          <p:nvPr/>
+        </p:nvSpPr>
+        <p:spPr>
+          <a:xfrm>
+            <a:off x="6967146" y="5862940"/>
+            <a:ext cx="1051718" cy="338554"/>
+          </a:xfrm>
+          <a:prstGeom prst="rect">
+            <a:avLst/>
+          </a:prstGeom>
+          <a:noFill/>
+        </p:spPr>
+        <p:txBody>
+          <a:bodyPr wrap="square" rtlCol="0">
+            <a:spAutoFit/>
+          </a:bodyPr>
+          <a:lstStyle/>
+          <a:p>
+            <a:r>
+              <a:rPr lang="it-IT" sz="1600" dirty="0"/>
+              <a:t>@relucri</a:t>
+            </a:r>
+            <a:endParaRPr lang="en-US" sz="1600" dirty="0"/>
           </a:p>
         </p:txBody>
       </p:sp>
@@ -4537,10 +4696,10 @@
       </p:grpSpPr>
       <p:pic>
         <p:nvPicPr>
-          <p:cNvPr id="1028" name="Picture 4" descr="black and white computer keyboard">
-            <a:extLst>
-              <a:ext uri="{FF2B5EF4-FFF2-40B4-BE49-F238E27FC236}">
-                <a16:creationId xmlns:a16="http://schemas.microsoft.com/office/drawing/2014/main" id="{F7B8E93E-7448-43C9-9497-970C1EFC4F65}"/>
+          <p:cNvPr id="1028" name="Picture 4" descr="person on top of mountain looking at sunset">
+            <a:extLst>
+              <a:ext uri="{FF2B5EF4-FFF2-40B4-BE49-F238E27FC236}">
+                <a16:creationId xmlns:a16="http://schemas.microsoft.com/office/drawing/2014/main" id="{B2ADA993-3A46-42FA-9793-D2F4B4062F8A}"/>
               </a:ext>
             </a:extLst>
           </p:cNvPr>
@@ -4549,7 +4708,7 @@
           </p:cNvPicPr>
           <p:nvPr/>
         </p:nvPicPr>
-        <p:blipFill rotWithShape="1">
+        <p:blipFill>
           <a:blip r:embed="rId2">
             <a:extLst>
               <a:ext uri="{28A0092B-C50C-407E-A947-70E740481C1C}">
@@ -4557,13 +4716,15 @@
               </a:ext>
             </a:extLst>
           </a:blip>
-          <a:srcRect b="15667"/>
-          <a:stretch/>
+          <a:srcRect/>
+          <a:stretch>
+            <a:fillRect/>
+          </a:stretch>
         </p:blipFill>
         <p:spPr bwMode="auto">
           <a:xfrm>
-            <a:off x="-579120" y="0"/>
-            <a:ext cx="12789182" cy="7193915"/>
+            <a:off x="0" y="0"/>
+            <a:ext cx="12192000" cy="8132064"/>
           </a:xfrm>
           <a:prstGeom prst="rect">
             <a:avLst/>
@@ -4582,459 +4743,126 @@
       </p:pic>
       <p:sp>
         <p:nvSpPr>
-          <p:cNvPr id="71" name="Title 1">
-            <a:extLst>
-              <a:ext uri="{FF2B5EF4-FFF2-40B4-BE49-F238E27FC236}">
-                <a16:creationId xmlns:a16="http://schemas.microsoft.com/office/drawing/2014/main" id="{729B91E8-5F5D-4E4F-B4C3-4ECC5D4EBE6B}"/>
-              </a:ext>
-            </a:extLst>
-          </p:cNvPr>
-          <p:cNvSpPr>
-            <a:spLocks noGrp="1"/>
-          </p:cNvSpPr>
-          <p:nvPr>
-            <p:ph type="title"/>
-          </p:nvPr>
-        </p:nvSpPr>
-        <p:spPr>
-          <a:xfrm>
-            <a:off x="838200" y="365125"/>
-            <a:ext cx="10515600" cy="820207"/>
-          </a:xfrm>
-        </p:spPr>
-        <p:txBody>
-          <a:bodyPr anchor="t">
-            <a:normAutofit/>
-          </a:bodyPr>
-          <a:lstStyle/>
-          <a:p>
-            <a:r>
-              <a:rPr lang="it-IT" b="1" dirty="0" err="1">
-                <a:solidFill>
-                  <a:schemeClr val="bg1"/>
-                </a:solidFill>
-              </a:rPr>
-              <a:t>WoT</a:t>
-            </a:r>
-            <a:r>
-              <a:rPr lang="it-IT" b="1" dirty="0">
-                <a:solidFill>
-                  <a:schemeClr val="bg1"/>
-                </a:solidFill>
-              </a:rPr>
-              <a:t> Application Manager</a:t>
-            </a:r>
-            <a:endParaRPr lang="en-US" b="1" dirty="0">
-              <a:solidFill>
-                <a:schemeClr val="bg1"/>
-              </a:solidFill>
-            </a:endParaRPr>
-          </a:p>
-        </p:txBody>
-      </p:sp>
-      <p:sp>
-        <p:nvSpPr>
-          <p:cNvPr id="135" name="Content Placeholder 2">
-            <a:extLst>
-              <a:ext uri="{FF2B5EF4-FFF2-40B4-BE49-F238E27FC236}">
-                <a16:creationId xmlns:a16="http://schemas.microsoft.com/office/drawing/2014/main" id="{E63176F5-59AB-4B58-9DDE-021CAF272BFB}"/>
-              </a:ext>
-            </a:extLst>
-          </p:cNvPr>
-          <p:cNvSpPr>
-            <a:spLocks noGrp="1"/>
-          </p:cNvSpPr>
-          <p:nvPr>
-            <p:ph sz="half" idx="1"/>
-          </p:nvPr>
-        </p:nvSpPr>
-        <p:spPr>
-          <a:xfrm>
-            <a:off x="7010400" y="1681267"/>
-            <a:ext cx="5181600" cy="4179148"/>
-          </a:xfrm>
-        </p:spPr>
-        <p:txBody>
-          <a:bodyPr>
-            <a:normAutofit lnSpcReduction="10000"/>
-          </a:bodyPr>
-          <a:lstStyle/>
-          <a:p>
-            <a:r>
-              <a:rPr lang="it-IT" dirty="0">
-                <a:solidFill>
-                  <a:schemeClr val="bg1"/>
-                </a:solidFill>
-              </a:rPr>
-              <a:t>Helps to </a:t>
-            </a:r>
-            <a:r>
-              <a:rPr lang="it-IT" dirty="0" err="1">
-                <a:solidFill>
-                  <a:schemeClr val="bg1"/>
-                </a:solidFill>
-              </a:rPr>
-              <a:t>correctly</a:t>
-            </a:r>
-            <a:r>
-              <a:rPr lang="it-IT" dirty="0">
-                <a:solidFill>
-                  <a:schemeClr val="bg1"/>
-                </a:solidFill>
-              </a:rPr>
-              <a:t> </a:t>
-            </a:r>
-            <a:r>
-              <a:rPr lang="it-IT" dirty="0" err="1">
-                <a:solidFill>
-                  <a:schemeClr val="bg1"/>
-                </a:solidFill>
-              </a:rPr>
-              <a:t>initialize</a:t>
-            </a:r>
-            <a:r>
-              <a:rPr lang="it-IT" dirty="0">
-                <a:solidFill>
-                  <a:schemeClr val="bg1"/>
-                </a:solidFill>
-              </a:rPr>
-              <a:t> a </a:t>
-            </a:r>
-            <a:r>
-              <a:rPr lang="it-IT" dirty="0" err="1">
-                <a:solidFill>
-                  <a:schemeClr val="bg1"/>
-                </a:solidFill>
-              </a:rPr>
-              <a:t>WoT</a:t>
-            </a:r>
-            <a:r>
-              <a:rPr lang="it-IT" dirty="0">
-                <a:solidFill>
-                  <a:schemeClr val="bg1"/>
-                </a:solidFill>
-              </a:rPr>
-              <a:t> </a:t>
-            </a:r>
-            <a:r>
-              <a:rPr lang="it-IT" dirty="0" err="1">
-                <a:solidFill>
-                  <a:schemeClr val="bg1"/>
-                </a:solidFill>
-              </a:rPr>
-              <a:t>application</a:t>
-            </a:r>
-            <a:r>
-              <a:rPr lang="it-IT" dirty="0">
-                <a:solidFill>
-                  <a:schemeClr val="bg1"/>
-                </a:solidFill>
-              </a:rPr>
-              <a:t> project (JS or TS)</a:t>
-            </a:r>
-          </a:p>
-          <a:p>
-            <a:r>
-              <a:rPr lang="it-IT" dirty="0">
-                <a:solidFill>
-                  <a:schemeClr val="bg1"/>
-                </a:solidFill>
-              </a:rPr>
-              <a:t>Bundle </a:t>
-            </a:r>
-            <a:r>
-              <a:rPr lang="it-IT" dirty="0" err="1">
-                <a:solidFill>
-                  <a:schemeClr val="bg1"/>
-                </a:solidFill>
-              </a:rPr>
-              <a:t>your</a:t>
-            </a:r>
-            <a:r>
-              <a:rPr lang="it-IT" dirty="0">
-                <a:solidFill>
-                  <a:schemeClr val="bg1"/>
-                </a:solidFill>
-              </a:rPr>
-              <a:t> </a:t>
-            </a:r>
-            <a:r>
-              <a:rPr lang="it-IT" dirty="0" err="1">
-                <a:solidFill>
-                  <a:schemeClr val="bg1"/>
-                </a:solidFill>
-              </a:rPr>
-              <a:t>application</a:t>
-            </a:r>
-            <a:r>
-              <a:rPr lang="it-IT" dirty="0">
-                <a:solidFill>
-                  <a:schemeClr val="bg1"/>
-                </a:solidFill>
-              </a:rPr>
-              <a:t> in a single file</a:t>
-            </a:r>
-          </a:p>
-          <a:p>
-            <a:r>
-              <a:rPr lang="en-US" dirty="0">
-                <a:solidFill>
-                  <a:schemeClr val="bg1"/>
-                </a:solidFill>
-              </a:rPr>
-              <a:t>Mainly oriented to </a:t>
-            </a:r>
-            <a:r>
-              <a:rPr lang="en-US" dirty="0" err="1">
-                <a:solidFill>
-                  <a:schemeClr val="bg1"/>
-                </a:solidFill>
-              </a:rPr>
-              <a:t>vscode</a:t>
-            </a:r>
-            <a:r>
-              <a:rPr lang="en-US" dirty="0">
-                <a:solidFill>
-                  <a:schemeClr val="bg1"/>
-                </a:solidFill>
-              </a:rPr>
-              <a:t> projects with support for automatic code </a:t>
-            </a:r>
-            <a:r>
-              <a:rPr lang="it-IT" dirty="0" err="1">
-                <a:solidFill>
-                  <a:schemeClr val="bg1"/>
-                </a:solidFill>
-              </a:rPr>
-              <a:t>completion</a:t>
-            </a:r>
-            <a:endParaRPr lang="it-IT" dirty="0">
-              <a:solidFill>
-                <a:schemeClr val="bg1"/>
-              </a:solidFill>
-            </a:endParaRPr>
-          </a:p>
-          <a:p>
-            <a:r>
-              <a:rPr lang="it-IT" dirty="0">
-                <a:solidFill>
-                  <a:schemeClr val="bg1"/>
-                </a:solidFill>
-              </a:rPr>
-              <a:t>Basic support for project </a:t>
-            </a:r>
-            <a:r>
-              <a:rPr lang="it-IT" dirty="0" err="1">
-                <a:solidFill>
-                  <a:schemeClr val="bg1"/>
-                </a:solidFill>
-              </a:rPr>
-              <a:t>templating</a:t>
-            </a:r>
-            <a:endParaRPr lang="en-US" dirty="0">
-              <a:solidFill>
-                <a:schemeClr val="bg1"/>
-              </a:solidFill>
-            </a:endParaRPr>
+          <p:cNvPr id="4" name="Segnaposto piè di pagina 3">
+            <a:extLst>
+              <a:ext uri="{FF2B5EF4-FFF2-40B4-BE49-F238E27FC236}">
+                <a16:creationId xmlns:a16="http://schemas.microsoft.com/office/drawing/2014/main" id="{15FB2871-7426-4CA3-AE28-30209D95FC47}"/>
+              </a:ext>
+            </a:extLst>
+          </p:cNvPr>
+          <p:cNvSpPr>
+            <a:spLocks noGrp="1"/>
+          </p:cNvSpPr>
+          <p:nvPr>
+            <p:ph type="ftr" sz="quarter" idx="11"/>
+          </p:nvPr>
+        </p:nvSpPr>
+        <p:spPr/>
+        <p:txBody>
+          <a:bodyPr/>
+          <a:lstStyle/>
+          <a:p>
+            <a:r>
+              <a:rPr lang="en-US"/>
+              <a:t>W3C Web of Things (WoT) WG/IG</a:t>
+            </a:r>
+          </a:p>
+        </p:txBody>
+      </p:sp>
+      <p:sp>
+        <p:nvSpPr>
+          <p:cNvPr id="5" name="Segnaposto numero diapositiva 4">
+            <a:extLst>
+              <a:ext uri="{FF2B5EF4-FFF2-40B4-BE49-F238E27FC236}">
+                <a16:creationId xmlns:a16="http://schemas.microsoft.com/office/drawing/2014/main" id="{A386378D-B223-46E4-B435-B55E357E0A3A}"/>
+              </a:ext>
+            </a:extLst>
+          </p:cNvPr>
+          <p:cNvSpPr>
+            <a:spLocks noGrp="1"/>
+          </p:cNvSpPr>
+          <p:nvPr>
+            <p:ph type="sldNum" sz="quarter" idx="12"/>
+          </p:nvPr>
+        </p:nvSpPr>
+        <p:spPr/>
+        <p:txBody>
+          <a:bodyPr/>
+          <a:lstStyle/>
+          <a:p>
+            <a:fld id="{055BDE2E-7167-1944-9FEE-E44668D91CB6}" type="slidenum">
+              <a:rPr lang="en-US" smtClean="0"/>
+              <a:t>2</a:t>
+            </a:fld>
+            <a:endParaRPr lang="en-US"/>
+          </a:p>
+        </p:txBody>
+      </p:sp>
+      <p:sp>
+        <p:nvSpPr>
+          <p:cNvPr id="6" name="Segnaposto data 5">
+            <a:extLst>
+              <a:ext uri="{FF2B5EF4-FFF2-40B4-BE49-F238E27FC236}">
+                <a16:creationId xmlns:a16="http://schemas.microsoft.com/office/drawing/2014/main" id="{0E5F5099-7065-4FE0-BBD3-AF66B6BED8D1}"/>
+              </a:ext>
+            </a:extLst>
+          </p:cNvPr>
+          <p:cNvSpPr>
+            <a:spLocks noGrp="1"/>
+          </p:cNvSpPr>
+          <p:nvPr>
+            <p:ph type="dt" sz="half" idx="10"/>
+          </p:nvPr>
+        </p:nvSpPr>
+        <p:spPr/>
+        <p:txBody>
+          <a:bodyPr/>
+          <a:lstStyle/>
+          <a:p>
+            <a:fld id="{B929AB1E-7FD9-0A40-B7C0-508CCACB3E9A}" type="datetime1">
+              <a:rPr lang="en-CA" smtClean="0"/>
+              <a:t>2020-09-02</a:t>
+            </a:fld>
+            <a:endParaRPr lang="en-US"/>
           </a:p>
         </p:txBody>
       </p:sp>
       <p:pic>
         <p:nvPicPr>
-          <p:cNvPr id="1026" name="Picture 2">
-            <a:extLst>
-              <a:ext uri="{FF2B5EF4-FFF2-40B4-BE49-F238E27FC236}">
-                <a16:creationId xmlns:a16="http://schemas.microsoft.com/office/drawing/2014/main" id="{34E4EFA1-CBED-459C-8B09-9A8E60C864BC}"/>
+          <p:cNvPr id="7" name="Immagine 6" descr="Immagine che contiene disegnando, segnale, maglietta&#10;&#10;Descrizione generata automaticamente">
+            <a:extLst>
+              <a:ext uri="{FF2B5EF4-FFF2-40B4-BE49-F238E27FC236}">
+                <a16:creationId xmlns:a16="http://schemas.microsoft.com/office/drawing/2014/main" id="{3FC656A1-9914-4F52-8805-8904113878F6}"/>
               </a:ext>
             </a:extLst>
           </p:cNvPr>
           <p:cNvPicPr>
-            <a:picLocks noChangeAspect="1" noChangeArrowheads="1"/>
+            <a:picLocks noChangeAspect="1"/>
           </p:cNvPicPr>
           <p:nvPr/>
         </p:nvPicPr>
         <p:blipFill>
-          <a:blip r:embed="rId3">
-            <a:extLst>
-              <a:ext uri="{28A0092B-C50C-407E-A947-70E740481C1C}">
-                <a14:useLocalDpi xmlns:a14="http://schemas.microsoft.com/office/drawing/2010/main" val="0"/>
-              </a:ext>
-            </a:extLst>
-          </a:blip>
+          <a:blip r:embed="rId3"/>
           <a:stretch>
             <a:fillRect/>
           </a:stretch>
         </p:blipFill>
-        <p:spPr bwMode="auto">
-          <a:xfrm>
-            <a:off x="949960" y="3105361"/>
-            <a:ext cx="3722958" cy="1330960"/>
-          </a:xfrm>
-          <a:prstGeom prst="rect">
-            <a:avLst/>
-          </a:prstGeom>
-          <a:noFill/>
-          <a:extLst>
-            <a:ext uri="{909E8E84-426E-40DD-AFC4-6F175D3DCCD1}">
-              <a14:hiddenFill xmlns:a14="http://schemas.microsoft.com/office/drawing/2010/main">
-                <a:solidFill>
-                  <a:srgbClr val="FFFFFF"/>
-                </a:solidFill>
-              </a14:hiddenFill>
-            </a:ext>
-          </a:extLst>
+        <p:spPr>
+          <a:xfrm>
+            <a:off x="10764654" y="112395"/>
+            <a:ext cx="1368291" cy="818694"/>
+          </a:xfrm>
+          <a:prstGeom prst="rect">
+            <a:avLst/>
+          </a:prstGeom>
         </p:spPr>
       </p:pic>
-      <p:sp>
-        <p:nvSpPr>
-          <p:cNvPr id="5" name="Date Placeholder 4">
-            <a:extLst>
-              <a:ext uri="{FF2B5EF4-FFF2-40B4-BE49-F238E27FC236}">
-                <a16:creationId xmlns:a16="http://schemas.microsoft.com/office/drawing/2014/main" id="{5763E547-66FF-8D41-A445-B9D23F2D3AC3}"/>
-              </a:ext>
-            </a:extLst>
-          </p:cNvPr>
-          <p:cNvSpPr>
-            <a:spLocks noGrp="1"/>
-          </p:cNvSpPr>
-          <p:nvPr>
-            <p:ph type="dt" sz="half" idx="10"/>
-          </p:nvPr>
-        </p:nvSpPr>
-        <p:spPr>
-          <a:xfrm>
-            <a:off x="838200" y="6356350"/>
-            <a:ext cx="2743200" cy="365125"/>
-          </a:xfrm>
-        </p:spPr>
-        <p:txBody>
-          <a:bodyPr>
-            <a:normAutofit/>
-          </a:bodyPr>
-          <a:lstStyle/>
-          <a:p>
-            <a:pPr>
-              <a:lnSpc>
-                <a:spcPct val="90000"/>
-              </a:lnSpc>
-              <a:spcAft>
-                <a:spcPts val="600"/>
-              </a:spcAft>
-            </a:pPr>
-            <a:fld id="{BF92DA42-2970-1B4D-9C1F-77F249CD7467}" type="datetime1">
-              <a:rPr lang="en-CA" smtClean="0"/>
-              <a:pPr>
-                <a:lnSpc>
-                  <a:spcPct val="90000"/>
-                </a:lnSpc>
-                <a:spcAft>
-                  <a:spcPts val="600"/>
-                </a:spcAft>
-              </a:pPr>
-              <a:t>2020-07-22</a:t>
-            </a:fld>
-            <a:endParaRPr lang="en-US"/>
-          </a:p>
-        </p:txBody>
-      </p:sp>
-      <p:sp>
-        <p:nvSpPr>
-          <p:cNvPr id="6" name="Footer Placeholder 5">
-            <a:extLst>
-              <a:ext uri="{FF2B5EF4-FFF2-40B4-BE49-F238E27FC236}">
-                <a16:creationId xmlns:a16="http://schemas.microsoft.com/office/drawing/2014/main" id="{C403CDDC-3456-C849-BC93-92466B8AD9BE}"/>
-              </a:ext>
-            </a:extLst>
-          </p:cNvPr>
-          <p:cNvSpPr>
-            <a:spLocks noGrp="1"/>
-          </p:cNvSpPr>
-          <p:nvPr>
-            <p:ph type="ftr" sz="quarter" idx="11"/>
-          </p:nvPr>
-        </p:nvSpPr>
-        <p:spPr>
-          <a:xfrm>
-            <a:off x="4038600" y="6356350"/>
-            <a:ext cx="4114800" cy="365125"/>
-          </a:xfrm>
-        </p:spPr>
-        <p:txBody>
-          <a:bodyPr anchor="ctr">
-            <a:normAutofit/>
-          </a:bodyPr>
-          <a:lstStyle/>
-          <a:p>
-            <a:pPr>
-              <a:spcAft>
-                <a:spcPts val="600"/>
-              </a:spcAft>
-            </a:pPr>
-            <a:r>
-              <a:rPr lang="en-US"/>
-              <a:t>W3C Web of Things (WoT) WG/IG</a:t>
-            </a:r>
-          </a:p>
-        </p:txBody>
-      </p:sp>
-      <p:sp>
-        <p:nvSpPr>
-          <p:cNvPr id="7" name="Slide Number Placeholder 6">
-            <a:extLst>
-              <a:ext uri="{FF2B5EF4-FFF2-40B4-BE49-F238E27FC236}">
-                <a16:creationId xmlns:a16="http://schemas.microsoft.com/office/drawing/2014/main" id="{B2AB2D99-10F9-7144-B8A4-C7301A569FCB}"/>
-              </a:ext>
-            </a:extLst>
-          </p:cNvPr>
-          <p:cNvSpPr>
-            <a:spLocks noGrp="1"/>
-          </p:cNvSpPr>
-          <p:nvPr>
-            <p:ph type="sldNum" sz="quarter" idx="12"/>
-          </p:nvPr>
-        </p:nvSpPr>
-        <p:spPr>
-          <a:xfrm>
-            <a:off x="8610600" y="6356350"/>
-            <a:ext cx="2743200" cy="365125"/>
-          </a:xfrm>
-        </p:spPr>
-        <p:txBody>
-          <a:bodyPr>
-            <a:normAutofit/>
-          </a:bodyPr>
-          <a:lstStyle/>
-          <a:p>
-            <a:pPr>
-              <a:lnSpc>
-                <a:spcPct val="90000"/>
-              </a:lnSpc>
-              <a:spcAft>
-                <a:spcPts val="600"/>
-              </a:spcAft>
-            </a:pPr>
-            <a:fld id="{055BDE2E-7167-1944-9FEE-E44668D91CB6}" type="slidenum">
-              <a:rPr lang="en-US" smtClean="0"/>
-              <a:pPr>
-                <a:lnSpc>
-                  <a:spcPct val="90000"/>
-                </a:lnSpc>
-                <a:spcAft>
-                  <a:spcPts val="600"/>
-                </a:spcAft>
-              </a:pPr>
-              <a:t>2</a:t>
-            </a:fld>
-            <a:endParaRPr lang="en-US"/>
-          </a:p>
-        </p:txBody>
-      </p:sp>
       <p:pic>
         <p:nvPicPr>
-          <p:cNvPr id="18" name="Immagine 17" descr="Immagine che contiene disegnando, segnale, maglietta&#10;&#10;Descrizione generata automaticamente">
-            <a:extLst>
-              <a:ext uri="{FF2B5EF4-FFF2-40B4-BE49-F238E27FC236}">
-                <a16:creationId xmlns:a16="http://schemas.microsoft.com/office/drawing/2014/main" id="{836E26B2-DB9F-4969-AD8E-83A4339A1A76}"/>
+          <p:cNvPr id="3" name="Immagine 2">
+            <a:extLst>
+              <a:ext uri="{FF2B5EF4-FFF2-40B4-BE49-F238E27FC236}">
+                <a16:creationId xmlns:a16="http://schemas.microsoft.com/office/drawing/2014/main" id="{4772296D-7E97-44B1-884E-2AC3C57477C1}"/>
               </a:ext>
             </a:extLst>
           </p:cNvPr>
@@ -5051,8 +4879,8 @@
         </p:blipFill>
         <p:spPr>
           <a:xfrm>
-            <a:off x="10764654" y="112395"/>
-            <a:ext cx="1368291" cy="818694"/>
+            <a:off x="6096000" y="2333489"/>
+            <a:ext cx="5026058" cy="2747684"/>
           </a:xfrm>
           <a:prstGeom prst="rect">
             <a:avLst/>
@@ -5061,10 +4889,114 @@
       </p:pic>
       <p:sp>
         <p:nvSpPr>
-          <p:cNvPr id="13" name="CasellaDiTesto 12">
-            <a:extLst>
-              <a:ext uri="{FF2B5EF4-FFF2-40B4-BE49-F238E27FC236}">
-                <a16:creationId xmlns:a16="http://schemas.microsoft.com/office/drawing/2014/main" id="{A523A386-821B-4912-B04D-0B6D2D0AC113}"/>
+          <p:cNvPr id="9" name="Title 1">
+            <a:extLst>
+              <a:ext uri="{FF2B5EF4-FFF2-40B4-BE49-F238E27FC236}">
+                <a16:creationId xmlns:a16="http://schemas.microsoft.com/office/drawing/2014/main" id="{E5969201-D9BC-4694-9648-6AEA3140C54F}"/>
+              </a:ext>
+            </a:extLst>
+          </p:cNvPr>
+          <p:cNvSpPr>
+            <a:spLocks noGrp="1"/>
+          </p:cNvSpPr>
+          <p:nvPr>
+            <p:ph type="title"/>
+          </p:nvPr>
+        </p:nvSpPr>
+        <p:spPr>
+          <a:xfrm>
+            <a:off x="762785" y="365125"/>
+            <a:ext cx="10515600" cy="820207"/>
+          </a:xfrm>
+        </p:spPr>
+        <p:txBody>
+          <a:bodyPr anchor="t">
+            <a:normAutofit/>
+          </a:bodyPr>
+          <a:lstStyle/>
+          <a:p>
+            <a:r>
+              <a:rPr lang="it-IT" b="1" dirty="0">
+                <a:solidFill>
+                  <a:schemeClr val="bg1"/>
+                </a:solidFill>
+              </a:rPr>
+              <a:t>A new way to </a:t>
+            </a:r>
+            <a:r>
+              <a:rPr lang="it-IT" b="1" dirty="0" err="1">
+                <a:solidFill>
+                  <a:schemeClr val="bg1"/>
+                </a:solidFill>
+              </a:rPr>
+              <a:t>develop</a:t>
+            </a:r>
+            <a:r>
+              <a:rPr lang="it-IT" b="1" dirty="0">
+                <a:solidFill>
+                  <a:schemeClr val="bg1"/>
+                </a:solidFill>
+              </a:rPr>
+              <a:t> IoT </a:t>
+            </a:r>
+            <a:r>
+              <a:rPr lang="it-IT" b="1" dirty="0" err="1">
+                <a:solidFill>
+                  <a:schemeClr val="bg1"/>
+                </a:solidFill>
+              </a:rPr>
+              <a:t>applications</a:t>
+            </a:r>
+            <a:endParaRPr lang="en-US" b="1" dirty="0">
+              <a:solidFill>
+                <a:schemeClr val="bg1"/>
+              </a:solidFill>
+            </a:endParaRPr>
+          </a:p>
+        </p:txBody>
+      </p:sp>
+      <p:pic>
+        <p:nvPicPr>
+          <p:cNvPr id="10" name="Elemento grafico 9">
+            <a:extLst>
+              <a:ext uri="{FF2B5EF4-FFF2-40B4-BE49-F238E27FC236}">
+                <a16:creationId xmlns:a16="http://schemas.microsoft.com/office/drawing/2014/main" id="{B90CF492-7654-447D-BB04-A5C36CC56BF7}"/>
+              </a:ext>
+            </a:extLst>
+          </p:cNvPr>
+          <p:cNvPicPr>
+            <a:picLocks noChangeAspect="1"/>
+          </p:cNvPicPr>
+          <p:nvPr/>
+        </p:nvPicPr>
+        <p:blipFill>
+          <a:blip r:embed="rId5">
+            <a:extLst>
+              <a:ext uri="{96DAC541-7B7A-43D3-8B79-37D633B846F1}">
+                <asvg:svgBlip xmlns:asvg="http://schemas.microsoft.com/office/drawing/2016/SVG/main" r:embed="rId6"/>
+              </a:ext>
+            </a:extLst>
+          </a:blip>
+          <a:stretch>
+            <a:fillRect/>
+          </a:stretch>
+        </p:blipFill>
+        <p:spPr>
+          <a:xfrm>
+            <a:off x="1649291" y="2882085"/>
+            <a:ext cx="1650492" cy="1650492"/>
+          </a:xfrm>
+          <a:prstGeom prst="rect">
+            <a:avLst/>
+          </a:prstGeom>
+        </p:spPr>
+      </p:pic>
+      <p:sp>
+        <p:nvSpPr>
+          <p:cNvPr id="2" name="CasellaDiTesto 1">
+            <a:extLst>
+              <a:ext uri="{FF2B5EF4-FFF2-40B4-BE49-F238E27FC236}">
+                <a16:creationId xmlns:a16="http://schemas.microsoft.com/office/drawing/2014/main" id="{EFF91494-8AFB-40E2-8A65-8793E27C91D0}"/>
               </a:ext>
             </a:extLst>
           </p:cNvPr>
@@ -5073,8 +5005,8 @@
         </p:nvSpPr>
         <p:spPr>
           <a:xfrm>
-            <a:off x="3017520" y="6631767"/>
-            <a:ext cx="6156960" cy="276999"/>
+            <a:off x="1066800" y="4678402"/>
+            <a:ext cx="2743200" cy="461665"/>
           </a:xfrm>
           <a:prstGeom prst="rect">
             <a:avLst/>
@@ -5089,64 +5021,32 @@
           <a:p>
             <a:pPr algn="ctr"/>
             <a:r>
-              <a:rPr lang="it-IT" sz="1200" dirty="0">
+              <a:rPr lang="it-IT" sz="2400" b="1" dirty="0" err="1">
                 <a:solidFill>
-                  <a:schemeClr val="bg1">
-                    <a:lumMod val="65000"/>
-                  </a:schemeClr>
+                  <a:schemeClr val="bg1"/>
                 </a:solidFill>
               </a:rPr>
-              <a:t>Photo made by </a:t>
-            </a:r>
-            <a:r>
-              <a:rPr lang="it-IT" sz="1200" dirty="0">
+              <a:t>Thing</a:t>
+            </a:r>
+            <a:r>
+              <a:rPr lang="it-IT" sz="2400" b="1" dirty="0">
                 <a:solidFill>
-                  <a:schemeClr val="bg1">
-                    <a:lumMod val="65000"/>
-                  </a:schemeClr>
-                </a:solidFill>
-                <a:hlinkClick r:id="rId5">
-                  <a:extLst>
-                    <a:ext uri="{A12FA001-AC4F-418D-AE19-62706E023703}">
-                      <ahyp:hlinkClr xmlns:ahyp="http://schemas.microsoft.com/office/drawing/2018/hyperlinkcolor" val="tx"/>
-                    </a:ext>
-                  </a:extLst>
-                </a:hlinkClick>
-              </a:rPr>
-              <a:t>@kensuarez</a:t>
-            </a:r>
-            <a:r>
-              <a:rPr lang="it-IT" sz="1200" dirty="0">
-                <a:solidFill>
-                  <a:schemeClr val="bg1">
-                    <a:lumMod val="65000"/>
-                  </a:schemeClr>
+                  <a:schemeClr val="bg1"/>
                 </a:solidFill>
               </a:rPr>
-              <a:t> on </a:t>
-            </a:r>
-            <a:r>
-              <a:rPr lang="it-IT" sz="1200" dirty="0" err="1">
+              <a:t> </a:t>
+            </a:r>
+            <a:r>
+              <a:rPr lang="it-IT" sz="2400" b="1" dirty="0" err="1">
                 <a:solidFill>
-                  <a:schemeClr val="bg1">
-                    <a:lumMod val="65000"/>
-                  </a:schemeClr>
+                  <a:schemeClr val="bg1"/>
                 </a:solidFill>
-                <a:hlinkClick r:id="rId6">
-                  <a:extLst>
-                    <a:ext uri="{A12FA001-AC4F-418D-AE19-62706E023703}">
-                      <ahyp:hlinkClr xmlns:ahyp="http://schemas.microsoft.com/office/drawing/2018/hyperlinkcolor" val="tx"/>
-                    </a:ext>
-                  </a:extLst>
-                </a:hlinkClick>
               </a:rPr>
-              <a:t>Unsplash</a:t>
-            </a:r>
-            <a:endParaRPr lang="en-US" sz="1200" dirty="0">
+              <a:t>Description</a:t>
+            </a:r>
+            <a:endParaRPr lang="en-US" sz="2400" b="1" dirty="0">
               <a:solidFill>
-                <a:schemeClr val="bg1">
-                  <a:lumMod val="65000"/>
-                </a:schemeClr>
+                <a:schemeClr val="bg1"/>
               </a:solidFill>
             </a:endParaRPr>
           </a:p>
@@ -5155,7 +5055,7 @@
     </p:spTree>
     <p:extLst>
       <p:ext uri="{BB962C8B-B14F-4D97-AF65-F5344CB8AC3E}">
-        <p14:creationId xmlns:p14="http://schemas.microsoft.com/office/powerpoint/2010/main" val="2239956326"/>
+        <p14:creationId xmlns:p14="http://schemas.microsoft.com/office/powerpoint/2010/main" val="2543836140"/>
       </p:ext>
     </p:extLst>
   </p:cSld>
@@ -5187,10 +5087,10 @@
       </p:grpSpPr>
       <p:pic>
         <p:nvPicPr>
-          <p:cNvPr id="4100" name="Picture 4" descr="macro photography of black circuit board">
-            <a:extLst>
-              <a:ext uri="{FF2B5EF4-FFF2-40B4-BE49-F238E27FC236}">
-                <a16:creationId xmlns:a16="http://schemas.microsoft.com/office/drawing/2014/main" id="{6ADBE6F5-182B-406D-8C28-AA81AD45B5A3}"/>
+          <p:cNvPr id="1028" name="Picture 4" descr="black and white computer keyboard">
+            <a:extLst>
+              <a:ext uri="{FF2B5EF4-FFF2-40B4-BE49-F238E27FC236}">
+                <a16:creationId xmlns:a16="http://schemas.microsoft.com/office/drawing/2014/main" id="{F7B8E93E-7448-43C9-9497-970C1EFC4F65}"/>
               </a:ext>
             </a:extLst>
           </p:cNvPr>
@@ -5199,32 +5099,21 @@
           </p:cNvPicPr>
           <p:nvPr/>
         </p:nvPicPr>
-        <p:blipFill>
+        <p:blipFill rotWithShape="1">
           <a:blip r:embed="rId2">
             <a:extLst>
-              <a:ext uri="{BEBA8EAE-BF5A-486C-A8C5-ECC9F3942E4B}">
-                <a14:imgProps xmlns:a14="http://schemas.microsoft.com/office/drawing/2010/main">
-                  <a14:imgLayer r:embed="rId3">
-                    <a14:imgEffect>
-                      <a14:brightnessContrast bright="-40000" contrast="-20000"/>
-                    </a14:imgEffect>
-                  </a14:imgLayer>
-                </a14:imgProps>
-              </a:ext>
               <a:ext uri="{28A0092B-C50C-407E-A947-70E740481C1C}">
                 <a14:useLocalDpi xmlns:a14="http://schemas.microsoft.com/office/drawing/2010/main" val="0"/>
               </a:ext>
             </a:extLst>
           </a:blip>
-          <a:srcRect/>
-          <a:stretch>
-            <a:fillRect/>
-          </a:stretch>
+          <a:srcRect b="15667"/>
+          <a:stretch/>
         </p:blipFill>
         <p:spPr bwMode="auto">
-          <a:xfrm>
-            <a:off x="0" y="3175"/>
-            <a:ext cx="12192000" cy="8132064"/>
+          <a:xfrm flipH="1">
+            <a:off x="0" y="-167958"/>
+            <a:ext cx="12789182" cy="7193915"/>
           </a:xfrm>
           <a:prstGeom prst="rect">
             <a:avLst/>
@@ -5293,6 +5182,221 @@
           </a:p>
         </p:txBody>
       </p:sp>
+      <p:sp>
+        <p:nvSpPr>
+          <p:cNvPr id="135" name="Content Placeholder 2">
+            <a:extLst>
+              <a:ext uri="{FF2B5EF4-FFF2-40B4-BE49-F238E27FC236}">
+                <a16:creationId xmlns:a16="http://schemas.microsoft.com/office/drawing/2014/main" id="{E63176F5-59AB-4B58-9DDE-021CAF272BFB}"/>
+              </a:ext>
+            </a:extLst>
+          </p:cNvPr>
+          <p:cNvSpPr>
+            <a:spLocks noGrp="1"/>
+          </p:cNvSpPr>
+          <p:nvPr>
+            <p:ph sz="half" idx="1"/>
+          </p:nvPr>
+        </p:nvSpPr>
+        <p:spPr>
+          <a:xfrm>
+            <a:off x="532435" y="1818975"/>
+            <a:ext cx="5181600" cy="4179148"/>
+          </a:xfrm>
+        </p:spPr>
+        <p:txBody>
+          <a:bodyPr>
+            <a:normAutofit lnSpcReduction="10000"/>
+          </a:bodyPr>
+          <a:lstStyle/>
+          <a:p>
+            <a:r>
+              <a:rPr lang="it-IT" dirty="0">
+                <a:solidFill>
+                  <a:schemeClr val="bg1"/>
+                </a:solidFill>
+              </a:rPr>
+              <a:t>Helps to </a:t>
+            </a:r>
+            <a:r>
+              <a:rPr lang="it-IT" dirty="0" err="1">
+                <a:solidFill>
+                  <a:schemeClr val="bg1"/>
+                </a:solidFill>
+              </a:rPr>
+              <a:t>correctly</a:t>
+            </a:r>
+            <a:r>
+              <a:rPr lang="it-IT" dirty="0">
+                <a:solidFill>
+                  <a:schemeClr val="bg1"/>
+                </a:solidFill>
+              </a:rPr>
+              <a:t> </a:t>
+            </a:r>
+            <a:r>
+              <a:rPr lang="it-IT" b="1" dirty="0" err="1">
+                <a:solidFill>
+                  <a:schemeClr val="bg1"/>
+                </a:solidFill>
+              </a:rPr>
+              <a:t>initialize</a:t>
+            </a:r>
+            <a:r>
+              <a:rPr lang="it-IT" dirty="0">
+                <a:solidFill>
+                  <a:schemeClr val="bg1"/>
+                </a:solidFill>
+              </a:rPr>
+              <a:t> a </a:t>
+            </a:r>
+            <a:r>
+              <a:rPr lang="it-IT" dirty="0" err="1">
+                <a:solidFill>
+                  <a:schemeClr val="bg1"/>
+                </a:solidFill>
+              </a:rPr>
+              <a:t>WoT</a:t>
+            </a:r>
+            <a:r>
+              <a:rPr lang="it-IT" dirty="0">
+                <a:solidFill>
+                  <a:schemeClr val="bg1"/>
+                </a:solidFill>
+              </a:rPr>
+              <a:t> </a:t>
+            </a:r>
+            <a:r>
+              <a:rPr lang="it-IT" dirty="0" err="1">
+                <a:solidFill>
+                  <a:schemeClr val="bg1"/>
+                </a:solidFill>
+              </a:rPr>
+              <a:t>application</a:t>
+            </a:r>
+            <a:r>
+              <a:rPr lang="it-IT" dirty="0">
+                <a:solidFill>
+                  <a:schemeClr val="bg1"/>
+                </a:solidFill>
+              </a:rPr>
+              <a:t> project (JS or TS)</a:t>
+            </a:r>
+          </a:p>
+          <a:p>
+            <a:r>
+              <a:rPr lang="it-IT" b="1" dirty="0">
+                <a:solidFill>
+                  <a:schemeClr val="bg1"/>
+                </a:solidFill>
+              </a:rPr>
+              <a:t>Bundle</a:t>
+            </a:r>
+            <a:r>
+              <a:rPr lang="it-IT" dirty="0">
+                <a:solidFill>
+                  <a:schemeClr val="bg1"/>
+                </a:solidFill>
+              </a:rPr>
+              <a:t> </a:t>
+            </a:r>
+            <a:r>
+              <a:rPr lang="it-IT" dirty="0" err="1">
+                <a:solidFill>
+                  <a:schemeClr val="bg1"/>
+                </a:solidFill>
+              </a:rPr>
+              <a:t>your</a:t>
+            </a:r>
+            <a:r>
+              <a:rPr lang="it-IT" dirty="0">
+                <a:solidFill>
+                  <a:schemeClr val="bg1"/>
+                </a:solidFill>
+              </a:rPr>
+              <a:t> </a:t>
+            </a:r>
+            <a:r>
+              <a:rPr lang="it-IT" dirty="0" err="1">
+                <a:solidFill>
+                  <a:schemeClr val="bg1"/>
+                </a:solidFill>
+              </a:rPr>
+              <a:t>application</a:t>
+            </a:r>
+            <a:r>
+              <a:rPr lang="it-IT" dirty="0">
+                <a:solidFill>
+                  <a:schemeClr val="bg1"/>
+                </a:solidFill>
+              </a:rPr>
+              <a:t> in a single file</a:t>
+            </a:r>
+          </a:p>
+          <a:p>
+            <a:r>
+              <a:rPr lang="en-US" dirty="0">
+                <a:solidFill>
+                  <a:schemeClr val="bg1"/>
+                </a:solidFill>
+              </a:rPr>
+              <a:t>Mainly oriented to </a:t>
+            </a:r>
+            <a:r>
+              <a:rPr lang="en-US" b="1" dirty="0" err="1">
+                <a:solidFill>
+                  <a:schemeClr val="bg1"/>
+                </a:solidFill>
+              </a:rPr>
+              <a:t>vscode</a:t>
+            </a:r>
+            <a:r>
+              <a:rPr lang="en-US" dirty="0">
+                <a:solidFill>
+                  <a:schemeClr val="bg1"/>
+                </a:solidFill>
+              </a:rPr>
+              <a:t> projects with support for automatic code </a:t>
+            </a:r>
+            <a:r>
+              <a:rPr lang="it-IT" dirty="0" err="1">
+                <a:solidFill>
+                  <a:schemeClr val="bg1"/>
+                </a:solidFill>
+              </a:rPr>
+              <a:t>completion</a:t>
+            </a:r>
+            <a:endParaRPr lang="it-IT" dirty="0">
+              <a:solidFill>
+                <a:schemeClr val="bg1"/>
+              </a:solidFill>
+            </a:endParaRPr>
+          </a:p>
+          <a:p>
+            <a:r>
+              <a:rPr lang="it-IT" dirty="0">
+                <a:solidFill>
+                  <a:schemeClr val="bg1"/>
+                </a:solidFill>
+              </a:rPr>
+              <a:t>Basic support for project </a:t>
+            </a:r>
+            <a:r>
+              <a:rPr lang="it-IT" b="1" dirty="0" err="1">
+                <a:solidFill>
+                  <a:schemeClr val="bg1"/>
+                </a:solidFill>
+              </a:rPr>
+              <a:t>templating</a:t>
+            </a:r>
+            <a:endParaRPr lang="en-US" b="1" dirty="0">
+              <a:solidFill>
+                <a:schemeClr val="bg1"/>
+              </a:solidFill>
+            </a:endParaRPr>
+          </a:p>
+        </p:txBody>
+      </p:sp>
       <p:pic>
         <p:nvPicPr>
           <p:cNvPr id="1026" name="Picture 2">
@@ -5308,7 +5412,7 @@
           <p:nvPr/>
         </p:nvPicPr>
         <p:blipFill>
-          <a:blip r:embed="rId4">
+          <a:blip r:embed="rId3">
             <a:extLst>
               <a:ext uri="{28A0092B-C50C-407E-A947-70E740481C1C}">
                 <a14:useLocalDpi xmlns:a14="http://schemas.microsoft.com/office/drawing/2010/main" val="0"/>
@@ -5321,8 +5425,8 @@
         </p:blipFill>
         <p:spPr bwMode="auto">
           <a:xfrm>
-            <a:off x="1107440" y="2741673"/>
-            <a:ext cx="3230880" cy="1155042"/>
+            <a:off x="7313001" y="2731542"/>
+            <a:ext cx="3722958" cy="1330960"/>
           </a:xfrm>
           <a:prstGeom prst="rect">
             <a:avLst/>
@@ -5385,7 +5489,7 @@
                   <a:spcPts val="600"/>
                 </a:spcAft>
               </a:pPr>
-              <a:t>2020-07-22</a:t>
+              <a:t>2020-09-02</a:t>
             </a:fld>
             <a:endParaRPr lang="en-US"/>
           </a:p>
@@ -5483,109 +5587,12 @@
           </a:p>
         </p:txBody>
       </p:sp>
-      <p:sp>
-        <p:nvSpPr>
-          <p:cNvPr id="11" name="CasellaDiTesto 10">
-            <a:extLst>
-              <a:ext uri="{FF2B5EF4-FFF2-40B4-BE49-F238E27FC236}">
-                <a16:creationId xmlns:a16="http://schemas.microsoft.com/office/drawing/2014/main" id="{2E7BE70C-3879-49AC-B674-6A5A1E1F2D66}"/>
-              </a:ext>
-            </a:extLst>
-          </p:cNvPr>
-          <p:cNvSpPr txBox="1"/>
-          <p:nvPr/>
-        </p:nvSpPr>
-        <p:spPr>
-          <a:xfrm>
-            <a:off x="6942291" y="2834641"/>
-            <a:ext cx="3768418" cy="1015663"/>
-          </a:xfrm>
-          <a:prstGeom prst="rect">
-            <a:avLst/>
-          </a:prstGeom>
-          <a:noFill/>
-        </p:spPr>
-        <p:txBody>
-          <a:bodyPr wrap="square" rtlCol="0">
-            <a:spAutoFit/>
-          </a:bodyPr>
-          <a:lstStyle/>
-          <a:p>
-            <a:pPr algn="ctr"/>
-            <a:r>
-              <a:rPr lang="it-IT" sz="6000" b="1" dirty="0" err="1">
-                <a:solidFill>
-                  <a:schemeClr val="bg1"/>
-                </a:solidFill>
-              </a:rPr>
-              <a:t>node-wot</a:t>
-            </a:r>
-            <a:endParaRPr lang="en-US" sz="6000" b="1" dirty="0">
-              <a:solidFill>
-                <a:schemeClr val="bg1"/>
-              </a:solidFill>
-            </a:endParaRPr>
-          </a:p>
-        </p:txBody>
-      </p:sp>
-      <p:sp>
-        <p:nvSpPr>
-          <p:cNvPr id="12" name="Cuore 11">
-            <a:extLst>
-              <a:ext uri="{FF2B5EF4-FFF2-40B4-BE49-F238E27FC236}">
-                <a16:creationId xmlns:a16="http://schemas.microsoft.com/office/drawing/2014/main" id="{DAF97400-8EA2-4C56-90DE-218583913F07}"/>
-              </a:ext>
-            </a:extLst>
-          </p:cNvPr>
-          <p:cNvSpPr/>
-          <p:nvPr/>
-        </p:nvSpPr>
-        <p:spPr>
-          <a:xfrm>
-            <a:off x="5666553" y="3111313"/>
-            <a:ext cx="635374" cy="635374"/>
-          </a:xfrm>
-          <a:prstGeom prst="heart">
-            <a:avLst/>
-          </a:prstGeom>
-          <a:solidFill>
-            <a:srgbClr val="FF0000"/>
-          </a:solidFill>
-          <a:ln>
-            <a:noFill/>
-          </a:ln>
-        </p:spPr>
-        <p:style>
-          <a:lnRef idx="2">
-            <a:schemeClr val="accent1">
-              <a:shade val="50000"/>
-            </a:schemeClr>
-          </a:lnRef>
-          <a:fillRef idx="1">
-            <a:schemeClr val="accent1"/>
-          </a:fillRef>
-          <a:effectRef idx="0">
-            <a:schemeClr val="accent1"/>
-          </a:effectRef>
-          <a:fontRef idx="minor">
-            <a:schemeClr val="lt1"/>
-          </a:fontRef>
-        </p:style>
-        <p:txBody>
-          <a:bodyPr rtlCol="0" anchor="ctr"/>
-          <a:lstStyle/>
-          <a:p>
-            <a:pPr algn="ctr"/>
-            <a:endParaRPr lang="en-US"/>
-          </a:p>
-        </p:txBody>
-      </p:sp>
       <p:pic>
         <p:nvPicPr>
           <p:cNvPr id="18" name="Immagine 17" descr="Immagine che contiene disegnando, segnale, maglietta&#10;&#10;Descrizione generata automaticamente">
             <a:extLst>
               <a:ext uri="{FF2B5EF4-FFF2-40B4-BE49-F238E27FC236}">
-                <a16:creationId xmlns:a16="http://schemas.microsoft.com/office/drawing/2014/main" id="{23050E22-FBD8-4E81-9266-44F486F714BC}"/>
+                <a16:creationId xmlns:a16="http://schemas.microsoft.com/office/drawing/2014/main" id="{836E26B2-DB9F-4969-AD8E-83A4339A1A76}"/>
               </a:ext>
             </a:extLst>
           </p:cNvPr>
@@ -5595,7 +5602,7 @@
           <p:nvPr/>
         </p:nvPicPr>
         <p:blipFill>
-          <a:blip r:embed="rId5"/>
+          <a:blip r:embed="rId4"/>
           <a:stretch>
             <a:fillRect/>
           </a:stretch>
@@ -5612,10 +5619,10 @@
       </p:pic>
       <p:sp>
         <p:nvSpPr>
-          <p:cNvPr id="19" name="CasellaDiTesto 18">
-            <a:extLst>
-              <a:ext uri="{FF2B5EF4-FFF2-40B4-BE49-F238E27FC236}">
-                <a16:creationId xmlns:a16="http://schemas.microsoft.com/office/drawing/2014/main" id="{B4016A9E-17A5-4556-AA5D-0284FCCFD6C3}"/>
+          <p:cNvPr id="13" name="CasellaDiTesto 12">
+            <a:extLst>
+              <a:ext uri="{FF2B5EF4-FFF2-40B4-BE49-F238E27FC236}">
+                <a16:creationId xmlns:a16="http://schemas.microsoft.com/office/drawing/2014/main" id="{A523A386-821B-4912-B04D-0B6D2D0AC113}"/>
               </a:ext>
             </a:extLst>
           </p:cNvPr>
@@ -5624,7 +5631,7 @@
         </p:nvSpPr>
         <p:spPr>
           <a:xfrm>
-            <a:off x="2974848" y="6631767"/>
+            <a:off x="3017520" y="6631767"/>
             <a:ext cx="6156960" cy="276999"/>
           </a:xfrm>
           <a:prstGeom prst="rect">
@@ -5651,6 +5658,33 @@
             </a:r>
             <a:r>
               <a:rPr lang="it-IT" sz="1200" dirty="0">
+                <a:solidFill>
+                  <a:schemeClr val="bg1">
+                    <a:lumMod val="65000"/>
+                  </a:schemeClr>
+                </a:solidFill>
+                <a:hlinkClick r:id="rId5">
+                  <a:extLst>
+                    <a:ext uri="{A12FA001-AC4F-418D-AE19-62706E023703}">
+                      <ahyp:hlinkClr xmlns:ahyp="http://schemas.microsoft.com/office/drawing/2018/hyperlinkcolor" val="tx"/>
+                    </a:ext>
+                  </a:extLst>
+                </a:hlinkClick>
+              </a:rPr>
+              <a:t>@kensuarez</a:t>
+            </a:r>
+            <a:r>
+              <a:rPr lang="it-IT" sz="1200" dirty="0">
+                <a:solidFill>
+                  <a:schemeClr val="bg1">
+                    <a:lumMod val="65000"/>
+                  </a:schemeClr>
+                </a:solidFill>
+              </a:rPr>
+              <a:t> on </a:t>
+            </a:r>
+            <a:r>
+              <a:rPr lang="it-IT" sz="1200" dirty="0" err="1">
                 <a:solidFill>
                   <a:schemeClr val="bg1">
                     <a:lumMod val="65000"/>
@@ -5664,33 +5698,6 @@
                   </a:extLst>
                 </a:hlinkClick>
               </a:rPr>
-              <a:t>@alexkixa</a:t>
-            </a:r>
-            <a:r>
-              <a:rPr lang="it-IT" sz="1200" dirty="0">
-                <a:solidFill>
-                  <a:schemeClr val="bg1">
-                    <a:lumMod val="65000"/>
-                  </a:schemeClr>
-                </a:solidFill>
-              </a:rPr>
-              <a:t> on </a:t>
-            </a:r>
-            <a:r>
-              <a:rPr lang="it-IT" sz="1200" dirty="0" err="1">
-                <a:solidFill>
-                  <a:schemeClr val="bg1">
-                    <a:lumMod val="65000"/>
-                  </a:schemeClr>
-                </a:solidFill>
-                <a:hlinkClick r:id="rId7">
-                  <a:extLst>
-                    <a:ext uri="{A12FA001-AC4F-418D-AE19-62706E023703}">
-                      <ahyp:hlinkClr xmlns:ahyp="http://schemas.microsoft.com/office/drawing/2018/hyperlinkcolor" val="tx"/>
-                    </a:ext>
-                  </a:extLst>
-                </a:hlinkClick>
-              </a:rPr>
               <a:t>Unsplash</a:t>
             </a:r>
             <a:endParaRPr lang="en-US" sz="1200" dirty="0">
@@ -5706,13 +5713,25 @@
     </p:spTree>
     <p:extLst>
       <p:ext uri="{BB962C8B-B14F-4D97-AF65-F5344CB8AC3E}">
-        <p14:creationId xmlns:p14="http://schemas.microsoft.com/office/powerpoint/2010/main" val="2757643554"/>
+        <p14:creationId xmlns:p14="http://schemas.microsoft.com/office/powerpoint/2010/main" val="2239956326"/>
       </p:ext>
     </p:extLst>
   </p:cSld>
   <p:clrMapOvr>
     <a:masterClrMapping/>
   </p:clrMapOvr>
+  <mc:AlternateContent xmlns:mc="http://schemas.openxmlformats.org/markup-compatibility/2006" xmlns:p14="http://schemas.microsoft.com/office/powerpoint/2010/main">
+    <mc:Choice Requires="p14">
+      <p:transition spd="med" p14:dur="700">
+        <p:fade/>
+      </p:transition>
+    </mc:Choice>
+    <mc:Fallback xmlns="">
+      <p:transition spd="med">
+        <p:fade/>
+      </p:transition>
+    </mc:Fallback>
+  </mc:AlternateContent>
 </p:sld>
 </file>
 
@@ -5735,10 +5754,10 @@
       </p:grpSpPr>
       <p:pic>
         <p:nvPicPr>
-          <p:cNvPr id="3076" name="Picture 4">
-            <a:extLst>
-              <a:ext uri="{FF2B5EF4-FFF2-40B4-BE49-F238E27FC236}">
-                <a16:creationId xmlns:a16="http://schemas.microsoft.com/office/drawing/2014/main" id="{EBAEC21B-BD08-48B1-8DD7-F8B99A8E6DD1}"/>
+          <p:cNvPr id="4100" name="Picture 4" descr="macro photography of black circuit board">
+            <a:extLst>
+              <a:ext uri="{FF2B5EF4-FFF2-40B4-BE49-F238E27FC236}">
+                <a16:creationId xmlns:a16="http://schemas.microsoft.com/office/drawing/2014/main" id="{6ADBE6F5-182B-406D-8C28-AA81AD45B5A3}"/>
               </a:ext>
             </a:extLst>
           </p:cNvPr>
@@ -5754,7 +5773,7 @@
                 <a14:imgProps xmlns:a14="http://schemas.microsoft.com/office/drawing/2010/main">
                   <a14:imgLayer r:embed="rId3">
                     <a14:imgEffect>
-                      <a14:brightnessContrast bright="-40000" contrast="20000"/>
+                      <a14:brightnessContrast bright="-40000" contrast="-20000"/>
                     </a14:imgEffect>
                   </a14:imgLayer>
                 </a14:imgProps>
@@ -5771,8 +5790,8 @@
         </p:blipFill>
         <p:spPr bwMode="auto">
           <a:xfrm>
-            <a:off x="0" y="0"/>
-            <a:ext cx="12192000" cy="8132064"/>
+            <a:off x="-229999" y="-329748"/>
+            <a:ext cx="12533888" cy="8360104"/>
           </a:xfrm>
           <a:prstGeom prst="rect">
             <a:avLst/>
@@ -5807,35 +5826,86 @@
         </p:nvSpPr>
         <p:spPr>
           <a:xfrm>
-            <a:off x="1620520" y="2235200"/>
-            <a:ext cx="8950960" cy="1654137"/>
+            <a:off x="838200" y="365125"/>
+            <a:ext cx="10515600" cy="820207"/>
           </a:xfrm>
         </p:spPr>
         <p:txBody>
           <a:bodyPr anchor="t">
-            <a:noAutofit/>
+            <a:normAutofit/>
           </a:bodyPr>
           <a:lstStyle/>
           <a:p>
-            <a:pPr algn="ctr"/>
-            <a:r>
-              <a:rPr lang="it-IT" sz="17900" b="1" dirty="0">
+            <a:r>
+              <a:rPr lang="it-IT" b="1" dirty="0" err="1">
                 <a:solidFill>
                   <a:schemeClr val="bg1"/>
                 </a:solidFill>
-                <a:cs typeface="Aharoni" panose="02010803020104030203" pitchFamily="2" charset="-79"/>
               </a:rPr>
-              <a:t>Demo</a:t>
-            </a:r>
-            <a:endParaRPr lang="en-US" sz="17900" b="1" dirty="0">
+              <a:t>WoT</a:t>
+            </a:r>
+            <a:r>
+              <a:rPr lang="it-IT" b="1" dirty="0">
+                <a:solidFill>
+                  <a:schemeClr val="bg1"/>
+                </a:solidFill>
+              </a:rPr>
+              <a:t> Application Manager</a:t>
+            </a:r>
+            <a:endParaRPr lang="en-US" b="1" dirty="0">
               <a:solidFill>
                 <a:schemeClr val="bg1"/>
               </a:solidFill>
-              <a:cs typeface="Aharoni" panose="02010803020104030203" pitchFamily="2" charset="-79"/>
             </a:endParaRPr>
           </a:p>
         </p:txBody>
       </p:sp>
+      <p:pic>
+        <p:nvPicPr>
+          <p:cNvPr id="1026" name="Picture 2">
+            <a:extLst>
+              <a:ext uri="{FF2B5EF4-FFF2-40B4-BE49-F238E27FC236}">
+                <a16:creationId xmlns:a16="http://schemas.microsoft.com/office/drawing/2014/main" id="{34E4EFA1-CBED-459C-8B09-9A8E60C864BC}"/>
+              </a:ext>
+            </a:extLst>
+          </p:cNvPr>
+          <p:cNvPicPr>
+            <a:picLocks noChangeAspect="1" noChangeArrowheads="1"/>
+          </p:cNvPicPr>
+          <p:nvPr/>
+        </p:nvPicPr>
+        <p:blipFill>
+          <a:blip r:embed="rId4">
+            <a:extLst>
+              <a:ext uri="{28A0092B-C50C-407E-A947-70E740481C1C}">
+                <a14:useLocalDpi xmlns:a14="http://schemas.microsoft.com/office/drawing/2010/main" val="0"/>
+              </a:ext>
+            </a:extLst>
+          </a:blip>
+          <a:stretch>
+            <a:fillRect/>
+          </a:stretch>
+        </p:blipFill>
+        <p:spPr bwMode="auto">
+          <a:xfrm>
+            <a:off x="1107440" y="2741673"/>
+            <a:ext cx="3230880" cy="1155042"/>
+          </a:xfrm>
+          <a:prstGeom prst="rect">
+            <a:avLst/>
+          </a:prstGeom>
+          <a:noFill/>
+          <a:extLst>
+            <a:ext uri="{909E8E84-426E-40DD-AFC4-6F175D3DCCD1}">
+              <a14:hiddenFill xmlns:a14="http://schemas.microsoft.com/office/drawing/2010/main">
+                <a:solidFill>
+                  <a:srgbClr val="FFFFFF"/>
+                </a:solidFill>
+              </a14:hiddenFill>
+            </a:ext>
+          </a:extLst>
+        </p:spPr>
+      </p:pic>
       <p:sp>
         <p:nvSpPr>
           <p:cNvPr id="5" name="Date Placeholder 4">
@@ -5882,7 +5952,7 @@
                   <a:spcPts val="600"/>
                 </a:spcAft>
               </a:pPr>
-              <a:t>2020-07-22</a:t>
+              <a:t>2020-09-02</a:t>
             </a:fld>
             <a:endParaRPr lang="en-US"/>
           </a:p>
@@ -5980,6 +6050,515 @@
           </a:p>
         </p:txBody>
       </p:sp>
+      <p:sp>
+        <p:nvSpPr>
+          <p:cNvPr id="11" name="CasellaDiTesto 10">
+            <a:extLst>
+              <a:ext uri="{FF2B5EF4-FFF2-40B4-BE49-F238E27FC236}">
+                <a16:creationId xmlns:a16="http://schemas.microsoft.com/office/drawing/2014/main" id="{2E7BE70C-3879-49AC-B674-6A5A1E1F2D66}"/>
+              </a:ext>
+            </a:extLst>
+          </p:cNvPr>
+          <p:cNvSpPr txBox="1"/>
+          <p:nvPr/>
+        </p:nvSpPr>
+        <p:spPr>
+          <a:xfrm>
+            <a:off x="6942291" y="2834641"/>
+            <a:ext cx="3768418" cy="1015663"/>
+          </a:xfrm>
+          <a:prstGeom prst="rect">
+            <a:avLst/>
+          </a:prstGeom>
+          <a:noFill/>
+        </p:spPr>
+        <p:txBody>
+          <a:bodyPr wrap="square" rtlCol="0">
+            <a:spAutoFit/>
+          </a:bodyPr>
+          <a:lstStyle/>
+          <a:p>
+            <a:pPr algn="ctr"/>
+            <a:r>
+              <a:rPr lang="it-IT" sz="6000" b="1" dirty="0" err="1">
+                <a:solidFill>
+                  <a:schemeClr val="bg1"/>
+                </a:solidFill>
+              </a:rPr>
+              <a:t>node-wot</a:t>
+            </a:r>
+            <a:endParaRPr lang="en-US" sz="6000" b="1" dirty="0">
+              <a:solidFill>
+                <a:schemeClr val="bg1"/>
+              </a:solidFill>
+            </a:endParaRPr>
+          </a:p>
+        </p:txBody>
+      </p:sp>
+      <p:sp>
+        <p:nvSpPr>
+          <p:cNvPr id="12" name="Cuore 11">
+            <a:extLst>
+              <a:ext uri="{FF2B5EF4-FFF2-40B4-BE49-F238E27FC236}">
+                <a16:creationId xmlns:a16="http://schemas.microsoft.com/office/drawing/2014/main" id="{DAF97400-8EA2-4C56-90DE-218583913F07}"/>
+              </a:ext>
+            </a:extLst>
+          </p:cNvPr>
+          <p:cNvSpPr/>
+          <p:nvPr/>
+        </p:nvSpPr>
+        <p:spPr>
+          <a:xfrm>
+            <a:off x="5666553" y="3111313"/>
+            <a:ext cx="635374" cy="635374"/>
+          </a:xfrm>
+          <a:prstGeom prst="heart">
+            <a:avLst/>
+          </a:prstGeom>
+          <a:solidFill>
+            <a:srgbClr val="FF0000"/>
+          </a:solidFill>
+          <a:ln>
+            <a:noFill/>
+          </a:ln>
+        </p:spPr>
+        <p:style>
+          <a:lnRef idx="2">
+            <a:schemeClr val="accent1">
+              <a:shade val="50000"/>
+            </a:schemeClr>
+          </a:lnRef>
+          <a:fillRef idx="1">
+            <a:schemeClr val="accent1"/>
+          </a:fillRef>
+          <a:effectRef idx="0">
+            <a:schemeClr val="accent1"/>
+          </a:effectRef>
+          <a:fontRef idx="minor">
+            <a:schemeClr val="lt1"/>
+          </a:fontRef>
+        </p:style>
+        <p:txBody>
+          <a:bodyPr rtlCol="0" anchor="ctr"/>
+          <a:lstStyle/>
+          <a:p>
+            <a:pPr algn="ctr"/>
+            <a:endParaRPr lang="en-US"/>
+          </a:p>
+        </p:txBody>
+      </p:sp>
+      <p:pic>
+        <p:nvPicPr>
+          <p:cNvPr id="18" name="Immagine 17" descr="Immagine che contiene disegnando, segnale, maglietta&#10;&#10;Descrizione generata automaticamente">
+            <a:extLst>
+              <a:ext uri="{FF2B5EF4-FFF2-40B4-BE49-F238E27FC236}">
+                <a16:creationId xmlns:a16="http://schemas.microsoft.com/office/drawing/2014/main" id="{23050E22-FBD8-4E81-9266-44F486F714BC}"/>
+              </a:ext>
+            </a:extLst>
+          </p:cNvPr>
+          <p:cNvPicPr>
+            <a:picLocks noChangeAspect="1"/>
+          </p:cNvPicPr>
+          <p:nvPr/>
+        </p:nvPicPr>
+        <p:blipFill>
+          <a:blip r:embed="rId5"/>
+          <a:stretch>
+            <a:fillRect/>
+          </a:stretch>
+        </p:blipFill>
+        <p:spPr>
+          <a:xfrm>
+            <a:off x="10764654" y="112395"/>
+            <a:ext cx="1368291" cy="818694"/>
+          </a:xfrm>
+          <a:prstGeom prst="rect">
+            <a:avLst/>
+          </a:prstGeom>
+        </p:spPr>
+      </p:pic>
+      <p:sp>
+        <p:nvSpPr>
+          <p:cNvPr id="19" name="CasellaDiTesto 18">
+            <a:extLst>
+              <a:ext uri="{FF2B5EF4-FFF2-40B4-BE49-F238E27FC236}">
+                <a16:creationId xmlns:a16="http://schemas.microsoft.com/office/drawing/2014/main" id="{B4016A9E-17A5-4556-AA5D-0284FCCFD6C3}"/>
+              </a:ext>
+            </a:extLst>
+          </p:cNvPr>
+          <p:cNvSpPr txBox="1"/>
+          <p:nvPr/>
+        </p:nvSpPr>
+        <p:spPr>
+          <a:xfrm>
+            <a:off x="2974848" y="6631767"/>
+            <a:ext cx="6156960" cy="276999"/>
+          </a:xfrm>
+          <a:prstGeom prst="rect">
+            <a:avLst/>
+          </a:prstGeom>
+          <a:noFill/>
+        </p:spPr>
+        <p:txBody>
+          <a:bodyPr wrap="square" rtlCol="0">
+            <a:spAutoFit/>
+          </a:bodyPr>
+          <a:lstStyle/>
+          <a:p>
+            <a:pPr algn="ctr"/>
+            <a:r>
+              <a:rPr lang="it-IT" sz="1200" dirty="0">
+                <a:solidFill>
+                  <a:schemeClr val="bg1">
+                    <a:lumMod val="65000"/>
+                  </a:schemeClr>
+                </a:solidFill>
+              </a:rPr>
+              <a:t>Photo made by </a:t>
+            </a:r>
+            <a:r>
+              <a:rPr lang="it-IT" sz="1200" dirty="0">
+                <a:solidFill>
+                  <a:schemeClr val="bg1">
+                    <a:lumMod val="65000"/>
+                  </a:schemeClr>
+                </a:solidFill>
+                <a:hlinkClick r:id="rId6">
+                  <a:extLst>
+                    <a:ext uri="{A12FA001-AC4F-418D-AE19-62706E023703}">
+                      <ahyp:hlinkClr xmlns:ahyp="http://schemas.microsoft.com/office/drawing/2018/hyperlinkcolor" val="tx"/>
+                    </a:ext>
+                  </a:extLst>
+                </a:hlinkClick>
+              </a:rPr>
+              <a:t>@alexkixa</a:t>
+            </a:r>
+            <a:r>
+              <a:rPr lang="it-IT" sz="1200" dirty="0">
+                <a:solidFill>
+                  <a:schemeClr val="bg1">
+                    <a:lumMod val="65000"/>
+                  </a:schemeClr>
+                </a:solidFill>
+              </a:rPr>
+              <a:t> on </a:t>
+            </a:r>
+            <a:r>
+              <a:rPr lang="it-IT" sz="1200" dirty="0" err="1">
+                <a:solidFill>
+                  <a:schemeClr val="bg1">
+                    <a:lumMod val="65000"/>
+                  </a:schemeClr>
+                </a:solidFill>
+                <a:hlinkClick r:id="rId7">
+                  <a:extLst>
+                    <a:ext uri="{A12FA001-AC4F-418D-AE19-62706E023703}">
+                      <ahyp:hlinkClr xmlns:ahyp="http://schemas.microsoft.com/office/drawing/2018/hyperlinkcolor" val="tx"/>
+                    </a:ext>
+                  </a:extLst>
+                </a:hlinkClick>
+              </a:rPr>
+              <a:t>Unsplash</a:t>
+            </a:r>
+            <a:endParaRPr lang="en-US" sz="1200" dirty="0">
+              <a:solidFill>
+                <a:schemeClr val="bg1">
+                  <a:lumMod val="65000"/>
+                </a:schemeClr>
+              </a:solidFill>
+            </a:endParaRPr>
+          </a:p>
+        </p:txBody>
+      </p:sp>
+    </p:spTree>
+    <p:extLst>
+      <p:ext uri="{BB962C8B-B14F-4D97-AF65-F5344CB8AC3E}">
+        <p14:creationId xmlns:p14="http://schemas.microsoft.com/office/powerpoint/2010/main" val="2757643554"/>
+      </p:ext>
+    </p:extLst>
+  </p:cSld>
+  <p:clrMapOvr>
+    <a:masterClrMapping/>
+  </p:clrMapOvr>
+  <mc:AlternateContent xmlns:mc="http://schemas.openxmlformats.org/markup-compatibility/2006" xmlns:p14="http://schemas.microsoft.com/office/powerpoint/2010/main">
+    <mc:Choice Requires="p14">
+      <p:transition spd="med" p14:dur="700">
+        <p:fade/>
+      </p:transition>
+    </mc:Choice>
+    <mc:Fallback xmlns="">
+      <p:transition spd="med">
+        <p:fade/>
+      </p:transition>
+    </mc:Fallback>
+  </mc:AlternateContent>
+</p:sld>
+</file>
+
+<file path=ppt/slides/slide5.xml><?xml version="1.0" encoding="utf-8"?>
+<p:sld xmlns:a="http://schemas.openxmlformats.org/drawingml/2006/main" xmlns:r="http://schemas.openxmlformats.org/officeDocument/2006/relationships" xmlns:p="http://schemas.openxmlformats.org/presentationml/2006/main">
+  <p:cSld>
+    <p:spTree>
+      <p:nvGrpSpPr>
+        <p:cNvPr id="1" name=""/>
+        <p:cNvGrpSpPr/>
+        <p:nvPr/>
+      </p:nvGrpSpPr>
+      <p:grpSpPr>
+        <a:xfrm>
+          <a:off x="0" y="0"/>
+          <a:ext cx="0" cy="0"/>
+          <a:chOff x="0" y="0"/>
+          <a:chExt cx="0" cy="0"/>
+        </a:xfrm>
+      </p:grpSpPr>
+      <p:pic>
+        <p:nvPicPr>
+          <p:cNvPr id="3076" name="Picture 4">
+            <a:extLst>
+              <a:ext uri="{FF2B5EF4-FFF2-40B4-BE49-F238E27FC236}">
+                <a16:creationId xmlns:a16="http://schemas.microsoft.com/office/drawing/2014/main" id="{EBAEC21B-BD08-48B1-8DD7-F8B99A8E6DD1}"/>
+              </a:ext>
+            </a:extLst>
+          </p:cNvPr>
+          <p:cNvPicPr>
+            <a:picLocks noChangeAspect="1" noChangeArrowheads="1"/>
+          </p:cNvPicPr>
+          <p:nvPr/>
+        </p:nvPicPr>
+        <p:blipFill>
+          <a:blip r:embed="rId2">
+            <a:extLst>
+              <a:ext uri="{BEBA8EAE-BF5A-486C-A8C5-ECC9F3942E4B}">
+                <a14:imgProps xmlns:a14="http://schemas.microsoft.com/office/drawing/2010/main">
+                  <a14:imgLayer r:embed="rId3">
+                    <a14:imgEffect>
+                      <a14:brightnessContrast bright="-40000" contrast="20000"/>
+                    </a14:imgEffect>
+                  </a14:imgLayer>
+                </a14:imgProps>
+              </a:ext>
+              <a:ext uri="{28A0092B-C50C-407E-A947-70E740481C1C}">
+                <a14:useLocalDpi xmlns:a14="http://schemas.microsoft.com/office/drawing/2010/main" val="0"/>
+              </a:ext>
+            </a:extLst>
+          </a:blip>
+          <a:srcRect/>
+          <a:stretch>
+            <a:fillRect/>
+          </a:stretch>
+        </p:blipFill>
+        <p:spPr bwMode="auto">
+          <a:xfrm>
+            <a:off x="0" y="0"/>
+            <a:ext cx="12192000" cy="8132064"/>
+          </a:xfrm>
+          <a:prstGeom prst="rect">
+            <a:avLst/>
+          </a:prstGeom>
+          <a:noFill/>
+          <a:extLst>
+            <a:ext uri="{909E8E84-426E-40DD-AFC4-6F175D3DCCD1}">
+              <a14:hiddenFill xmlns:a14="http://schemas.microsoft.com/office/drawing/2010/main">
+                <a:solidFill>
+                  <a:srgbClr val="FFFFFF"/>
+                </a:solidFill>
+              </a14:hiddenFill>
+            </a:ext>
+          </a:extLst>
+        </p:spPr>
+      </p:pic>
+      <p:sp>
+        <p:nvSpPr>
+          <p:cNvPr id="71" name="Title 1">
+            <a:extLst>
+              <a:ext uri="{FF2B5EF4-FFF2-40B4-BE49-F238E27FC236}">
+                <a16:creationId xmlns:a16="http://schemas.microsoft.com/office/drawing/2014/main" id="{729B91E8-5F5D-4E4F-B4C3-4ECC5D4EBE6B}"/>
+              </a:ext>
+            </a:extLst>
+          </p:cNvPr>
+          <p:cNvSpPr>
+            <a:spLocks noGrp="1"/>
+          </p:cNvSpPr>
+          <p:nvPr>
+            <p:ph type="title"/>
+          </p:nvPr>
+        </p:nvSpPr>
+        <p:spPr>
+          <a:xfrm>
+            <a:off x="1620520" y="2235200"/>
+            <a:ext cx="8950960" cy="1654137"/>
+          </a:xfrm>
+        </p:spPr>
+        <p:txBody>
+          <a:bodyPr anchor="t">
+            <a:noAutofit/>
+          </a:bodyPr>
+          <a:lstStyle/>
+          <a:p>
+            <a:pPr algn="ctr"/>
+            <a:r>
+              <a:rPr lang="it-IT" sz="17900" b="1" dirty="0">
+                <a:solidFill>
+                  <a:schemeClr val="bg1"/>
+                </a:solidFill>
+                <a:cs typeface="Aharoni" panose="02010803020104030203" pitchFamily="2" charset="-79"/>
+              </a:rPr>
+              <a:t>Demo</a:t>
+            </a:r>
+            <a:endParaRPr lang="en-US" sz="17900" b="1" dirty="0">
+              <a:solidFill>
+                <a:schemeClr val="bg1"/>
+              </a:solidFill>
+              <a:cs typeface="Aharoni" panose="02010803020104030203" pitchFamily="2" charset="-79"/>
+            </a:endParaRPr>
+          </a:p>
+        </p:txBody>
+      </p:sp>
+      <p:sp>
+        <p:nvSpPr>
+          <p:cNvPr id="5" name="Date Placeholder 4">
+            <a:extLst>
+              <a:ext uri="{FF2B5EF4-FFF2-40B4-BE49-F238E27FC236}">
+                <a16:creationId xmlns:a16="http://schemas.microsoft.com/office/drawing/2014/main" id="{5763E547-66FF-8D41-A445-B9D23F2D3AC3}"/>
+              </a:ext>
+            </a:extLst>
+          </p:cNvPr>
+          <p:cNvSpPr>
+            <a:spLocks noGrp="1"/>
+          </p:cNvSpPr>
+          <p:nvPr>
+            <p:ph type="dt" sz="half" idx="10"/>
+          </p:nvPr>
+        </p:nvSpPr>
+        <p:spPr>
+          <a:xfrm>
+            <a:off x="838200" y="6356350"/>
+            <a:ext cx="2743200" cy="365125"/>
+          </a:xfrm>
+        </p:spPr>
+        <p:txBody>
+          <a:bodyPr>
+            <a:normAutofit/>
+          </a:bodyPr>
+          <a:lstStyle/>
+          <a:p>
+            <a:pPr>
+              <a:lnSpc>
+                <a:spcPct val="90000"/>
+              </a:lnSpc>
+              <a:spcAft>
+                <a:spcPts val="600"/>
+              </a:spcAft>
+            </a:pPr>
+            <a:fld id="{BF92DA42-2970-1B4D-9C1F-77F249CD7467}" type="datetime1">
+              <a:rPr lang="en-CA" smtClean="0"/>
+              <a:pPr>
+                <a:lnSpc>
+                  <a:spcPct val="90000"/>
+                </a:lnSpc>
+                <a:spcAft>
+                  <a:spcPts val="600"/>
+                </a:spcAft>
+              </a:pPr>
+              <a:t>2020-09-02</a:t>
+            </a:fld>
+            <a:endParaRPr lang="en-US"/>
+          </a:p>
+        </p:txBody>
+      </p:sp>
+      <p:sp>
+        <p:nvSpPr>
+          <p:cNvPr id="6" name="Footer Placeholder 5">
+            <a:extLst>
+              <a:ext uri="{FF2B5EF4-FFF2-40B4-BE49-F238E27FC236}">
+                <a16:creationId xmlns:a16="http://schemas.microsoft.com/office/drawing/2014/main" id="{C403CDDC-3456-C849-BC93-92466B8AD9BE}"/>
+              </a:ext>
+            </a:extLst>
+          </p:cNvPr>
+          <p:cNvSpPr>
+            <a:spLocks noGrp="1"/>
+          </p:cNvSpPr>
+          <p:nvPr>
+            <p:ph type="ftr" sz="quarter" idx="11"/>
+          </p:nvPr>
+        </p:nvSpPr>
+        <p:spPr>
+          <a:xfrm>
+            <a:off x="4038600" y="6356350"/>
+            <a:ext cx="4114800" cy="365125"/>
+          </a:xfrm>
+        </p:spPr>
+        <p:txBody>
+          <a:bodyPr anchor="ctr">
+            <a:normAutofit/>
+          </a:bodyPr>
+          <a:lstStyle/>
+          <a:p>
+            <a:pPr>
+              <a:spcAft>
+                <a:spcPts val="600"/>
+              </a:spcAft>
+            </a:pPr>
+            <a:r>
+              <a:rPr lang="en-US"/>
+              <a:t>W3C Web of Things (WoT) WG/IG</a:t>
+            </a:r>
+          </a:p>
+        </p:txBody>
+      </p:sp>
+      <p:sp>
+        <p:nvSpPr>
+          <p:cNvPr id="7" name="Slide Number Placeholder 6">
+            <a:extLst>
+              <a:ext uri="{FF2B5EF4-FFF2-40B4-BE49-F238E27FC236}">
+                <a16:creationId xmlns:a16="http://schemas.microsoft.com/office/drawing/2014/main" id="{B2AB2D99-10F9-7144-B8A4-C7301A569FCB}"/>
+              </a:ext>
+            </a:extLst>
+          </p:cNvPr>
+          <p:cNvSpPr>
+            <a:spLocks noGrp="1"/>
+          </p:cNvSpPr>
+          <p:nvPr>
+            <p:ph type="sldNum" sz="quarter" idx="12"/>
+          </p:nvPr>
+        </p:nvSpPr>
+        <p:spPr>
+          <a:xfrm>
+            <a:off x="8610600" y="6356350"/>
+            <a:ext cx="2743200" cy="365125"/>
+          </a:xfrm>
+        </p:spPr>
+        <p:txBody>
+          <a:bodyPr>
+            <a:normAutofit/>
+          </a:bodyPr>
+          <a:lstStyle/>
+          <a:p>
+            <a:pPr>
+              <a:lnSpc>
+                <a:spcPct val="90000"/>
+              </a:lnSpc>
+              <a:spcAft>
+                <a:spcPts val="600"/>
+              </a:spcAft>
+            </a:pPr>
+            <a:fld id="{055BDE2E-7167-1944-9FEE-E44668D91CB6}" type="slidenum">
+              <a:rPr lang="en-US" smtClean="0"/>
+              <a:pPr>
+                <a:lnSpc>
+                  <a:spcPct val="90000"/>
+                </a:lnSpc>
+                <a:spcAft>
+                  <a:spcPts val="600"/>
+                </a:spcAft>
+              </a:pPr>
+              <a:t>5</a:t>
+            </a:fld>
+            <a:endParaRPr lang="en-US"/>
+          </a:p>
+        </p:txBody>
+      </p:sp>
       <p:pic>
         <p:nvPicPr>
           <p:cNvPr id="12" name="Immagine 11" descr="Immagine che contiene disegnando, segnale, maglietta&#10;&#10;Descrizione generata automaticamente">
@@ -6113,10 +6692,22 @@
   <p:clrMapOvr>
     <a:masterClrMapping/>
   </p:clrMapOvr>
+  <mc:AlternateContent xmlns:mc="http://schemas.openxmlformats.org/markup-compatibility/2006" xmlns:p14="http://schemas.microsoft.com/office/powerpoint/2010/main">
+    <mc:Choice Requires="p14">
+      <p:transition spd="med" p14:dur="700">
+        <p:fade/>
+      </p:transition>
+    </mc:Choice>
+    <mc:Fallback xmlns="">
+      <p:transition spd="med">
+        <p:fade/>
+      </p:transition>
+    </mc:Fallback>
+  </mc:AlternateContent>
 </p:sld>
 </file>
 
-<file path=ppt/slides/slide5.xml><?xml version="1.0" encoding="utf-8"?>
+<file path=ppt/slides/slide6.xml><?xml version="1.0" encoding="utf-8"?>
 <p:sld xmlns:a="http://schemas.openxmlformats.org/drawingml/2006/main" xmlns:r="http://schemas.openxmlformats.org/officeDocument/2006/relationships" xmlns:p="http://schemas.openxmlformats.org/presentationml/2006/main">
   <p:cSld>
     <p:bg>
@@ -6286,463 +6877,7 @@
                   <a:spcPts val="600"/>
                 </a:spcAft>
               </a:pPr>
-              <a:t>2020-07-22</a:t>
-            </a:fld>
-            <a:endParaRPr lang="en-US"/>
-          </a:p>
-        </p:txBody>
-      </p:sp>
-      <p:sp>
-        <p:nvSpPr>
-          <p:cNvPr id="6" name="Footer Placeholder 5">
-            <a:extLst>
-              <a:ext uri="{FF2B5EF4-FFF2-40B4-BE49-F238E27FC236}">
-                <a16:creationId xmlns:a16="http://schemas.microsoft.com/office/drawing/2014/main" id="{C403CDDC-3456-C849-BC93-92466B8AD9BE}"/>
-              </a:ext>
-            </a:extLst>
-          </p:cNvPr>
-          <p:cNvSpPr>
-            <a:spLocks noGrp="1"/>
-          </p:cNvSpPr>
-          <p:nvPr>
-            <p:ph type="ftr" sz="quarter" idx="11"/>
-          </p:nvPr>
-        </p:nvSpPr>
-        <p:spPr>
-          <a:xfrm>
-            <a:off x="4038600" y="6356350"/>
-            <a:ext cx="4114800" cy="365125"/>
-          </a:xfrm>
-        </p:spPr>
-        <p:txBody>
-          <a:bodyPr anchor="ctr">
-            <a:normAutofit/>
-          </a:bodyPr>
-          <a:lstStyle/>
-          <a:p>
-            <a:pPr>
-              <a:spcAft>
-                <a:spcPts val="600"/>
-              </a:spcAft>
-            </a:pPr>
-            <a:r>
-              <a:rPr lang="en-US"/>
-              <a:t>W3C Web of Things (WoT) WG/IG</a:t>
-            </a:r>
-          </a:p>
-        </p:txBody>
-      </p:sp>
-      <p:sp>
-        <p:nvSpPr>
-          <p:cNvPr id="7" name="Slide Number Placeholder 6">
-            <a:extLst>
-              <a:ext uri="{FF2B5EF4-FFF2-40B4-BE49-F238E27FC236}">
-                <a16:creationId xmlns:a16="http://schemas.microsoft.com/office/drawing/2014/main" id="{B2AB2D99-10F9-7144-B8A4-C7301A569FCB}"/>
-              </a:ext>
-            </a:extLst>
-          </p:cNvPr>
-          <p:cNvSpPr>
-            <a:spLocks noGrp="1"/>
-          </p:cNvSpPr>
-          <p:nvPr>
-            <p:ph type="sldNum" sz="quarter" idx="12"/>
-          </p:nvPr>
-        </p:nvSpPr>
-        <p:spPr>
-          <a:xfrm>
-            <a:off x="8610600" y="6356350"/>
-            <a:ext cx="2743200" cy="365125"/>
-          </a:xfrm>
-        </p:spPr>
-        <p:txBody>
-          <a:bodyPr>
-            <a:normAutofit/>
-          </a:bodyPr>
-          <a:lstStyle/>
-          <a:p>
-            <a:pPr>
-              <a:lnSpc>
-                <a:spcPct val="90000"/>
-              </a:lnSpc>
-              <a:spcAft>
-                <a:spcPts val="600"/>
-              </a:spcAft>
-            </a:pPr>
-            <a:fld id="{055BDE2E-7167-1944-9FEE-E44668D91CB6}" type="slidenum">
-              <a:rPr lang="en-US" smtClean="0"/>
-              <a:pPr>
-                <a:lnSpc>
-                  <a:spcPct val="90000"/>
-                </a:lnSpc>
-                <a:spcAft>
-                  <a:spcPts val="600"/>
-                </a:spcAft>
-              </a:pPr>
-              <a:t>5</a:t>
-            </a:fld>
-            <a:endParaRPr lang="en-US"/>
-          </a:p>
-        </p:txBody>
-      </p:sp>
-      <p:pic>
-        <p:nvPicPr>
-          <p:cNvPr id="2050" name="Picture 2">
-            <a:extLst>
-              <a:ext uri="{FF2B5EF4-FFF2-40B4-BE49-F238E27FC236}">
-                <a16:creationId xmlns:a16="http://schemas.microsoft.com/office/drawing/2014/main" id="{2D8E9E76-629C-4AF6-B244-72D5708C72B8}"/>
-              </a:ext>
-            </a:extLst>
-          </p:cNvPr>
-          <p:cNvPicPr>
-            <a:picLocks noChangeAspect="1" noChangeArrowheads="1"/>
-          </p:cNvPicPr>
-          <p:nvPr/>
-        </p:nvPicPr>
-        <p:blipFill>
-          <a:blip r:embed="rId2">
-            <a:extLst>
-              <a:ext uri="{28A0092B-C50C-407E-A947-70E740481C1C}">
-                <a14:useLocalDpi xmlns:a14="http://schemas.microsoft.com/office/drawing/2010/main" val="0"/>
-              </a:ext>
-            </a:extLst>
-          </a:blip>
-          <a:srcRect/>
-          <a:stretch>
-            <a:fillRect/>
-          </a:stretch>
-        </p:blipFill>
-        <p:spPr bwMode="auto">
-          <a:xfrm>
-            <a:off x="279400" y="360289"/>
-            <a:ext cx="640080" cy="640080"/>
-          </a:xfrm>
-          <a:prstGeom prst="rect">
-            <a:avLst/>
-          </a:prstGeom>
-          <a:noFill/>
-          <a:extLst>
-            <a:ext uri="{909E8E84-426E-40DD-AFC4-6F175D3DCCD1}">
-              <a14:hiddenFill xmlns:a14="http://schemas.microsoft.com/office/drawing/2010/main">
-                <a:solidFill>
-                  <a:srgbClr val="FFFFFF"/>
-                </a:solidFill>
-              </a14:hiddenFill>
-            </a:ext>
-          </a:extLst>
-        </p:spPr>
-      </p:pic>
-      <p:sp>
-        <p:nvSpPr>
-          <p:cNvPr id="2" name="CasellaDiTesto 1">
-            <a:extLst>
-              <a:ext uri="{FF2B5EF4-FFF2-40B4-BE49-F238E27FC236}">
-                <a16:creationId xmlns:a16="http://schemas.microsoft.com/office/drawing/2014/main" id="{0596875C-9F75-4573-A332-2EF7D921E2B0}"/>
-              </a:ext>
-            </a:extLst>
-          </p:cNvPr>
-          <p:cNvSpPr txBox="1"/>
-          <p:nvPr/>
-        </p:nvSpPr>
-        <p:spPr>
-          <a:xfrm>
-            <a:off x="675640" y="2684495"/>
-            <a:ext cx="4851400" cy="1200329"/>
-          </a:xfrm>
-          <a:prstGeom prst="rect">
-            <a:avLst/>
-          </a:prstGeom>
-          <a:noFill/>
-        </p:spPr>
-        <p:txBody>
-          <a:bodyPr wrap="square" rtlCol="0">
-            <a:spAutoFit/>
-          </a:bodyPr>
-          <a:lstStyle/>
-          <a:p>
-            <a:r>
-              <a:rPr lang="en-US" sz="2400" dirty="0">
-                <a:solidFill>
-                  <a:schemeClr val="bg1"/>
-                </a:solidFill>
-              </a:rPr>
-              <a:t>Bare minimal </a:t>
-            </a:r>
-            <a:r>
-              <a:rPr lang="en-US" sz="2400" dirty="0" err="1">
-                <a:solidFill>
-                  <a:schemeClr val="bg1"/>
-                </a:solidFill>
-              </a:rPr>
-              <a:t>vscode</a:t>
-            </a:r>
-            <a:r>
-              <a:rPr lang="en-US" sz="2400" dirty="0">
-                <a:solidFill>
-                  <a:schemeClr val="bg1"/>
-                </a:solidFill>
-              </a:rPr>
-              <a:t> extension that adds code snippets for Thing Description files and validation.</a:t>
-            </a:r>
-          </a:p>
-        </p:txBody>
-      </p:sp>
-      <p:pic>
-        <p:nvPicPr>
-          <p:cNvPr id="2052" name="Picture 4" descr="code completion">
-            <a:extLst>
-              <a:ext uri="{FF2B5EF4-FFF2-40B4-BE49-F238E27FC236}">
-                <a16:creationId xmlns:a16="http://schemas.microsoft.com/office/drawing/2014/main" id="{EC6607AD-5411-46B7-B2AF-AB776546E6F5}"/>
-              </a:ext>
-            </a:extLst>
-          </p:cNvPr>
-          <p:cNvPicPr>
-            <a:picLocks noChangeAspect="1" noChangeArrowheads="1" noCrop="1"/>
-          </p:cNvPicPr>
-          <p:nvPr/>
-        </p:nvPicPr>
-        <p:blipFill>
-          <a:blip r:embed="rId3">
-            <a:extLst>
-              <a:ext uri="{28A0092B-C50C-407E-A947-70E740481C1C}">
-                <a14:useLocalDpi xmlns:a14="http://schemas.microsoft.com/office/drawing/2010/main" val="0"/>
-              </a:ext>
-            </a:extLst>
-          </a:blip>
-          <a:srcRect/>
-          <a:stretch>
-            <a:fillRect/>
-          </a:stretch>
-        </p:blipFill>
-        <p:spPr bwMode="auto">
-          <a:xfrm>
-            <a:off x="5492801" y="1699049"/>
-            <a:ext cx="6235598" cy="3459902"/>
-          </a:xfrm>
-          <a:prstGeom prst="rect">
-            <a:avLst/>
-          </a:prstGeom>
-          <a:noFill/>
-          <a:extLst>
-            <a:ext uri="{909E8E84-426E-40DD-AFC4-6F175D3DCCD1}">
-              <a14:hiddenFill xmlns:a14="http://schemas.microsoft.com/office/drawing/2010/main">
-                <a:solidFill>
-                  <a:srgbClr val="FFFFFF"/>
-                </a:solidFill>
-              </a14:hiddenFill>
-            </a:ext>
-          </a:extLst>
-        </p:spPr>
-      </p:pic>
-      <p:pic>
-        <p:nvPicPr>
-          <p:cNvPr id="12" name="Immagine 11" descr="Immagine che contiene disegnando, segnale, maglietta&#10;&#10;Descrizione generata automaticamente">
-            <a:extLst>
-              <a:ext uri="{FF2B5EF4-FFF2-40B4-BE49-F238E27FC236}">
-                <a16:creationId xmlns:a16="http://schemas.microsoft.com/office/drawing/2014/main" id="{84027AF7-A772-4918-BEFB-C5983E6D4A7D}"/>
-              </a:ext>
-            </a:extLst>
-          </p:cNvPr>
-          <p:cNvPicPr>
-            <a:picLocks noChangeAspect="1"/>
-          </p:cNvPicPr>
-          <p:nvPr/>
-        </p:nvPicPr>
-        <p:blipFill>
-          <a:blip r:embed="rId4"/>
-          <a:stretch>
-            <a:fillRect/>
-          </a:stretch>
-        </p:blipFill>
-        <p:spPr>
-          <a:xfrm>
-            <a:off x="10764654" y="112395"/>
-            <a:ext cx="1368291" cy="818694"/>
-          </a:xfrm>
-          <a:prstGeom prst="rect">
-            <a:avLst/>
-          </a:prstGeom>
-        </p:spPr>
-      </p:pic>
-    </p:spTree>
-    <p:extLst>
-      <p:ext uri="{BB962C8B-B14F-4D97-AF65-F5344CB8AC3E}">
-        <p14:creationId xmlns:p14="http://schemas.microsoft.com/office/powerpoint/2010/main" val="2205310853"/>
-      </p:ext>
-    </p:extLst>
-  </p:cSld>
-  <p:clrMapOvr>
-    <a:masterClrMapping/>
-  </p:clrMapOvr>
-</p:sld>
-</file>
-
-<file path=ppt/slides/slide6.xml><?xml version="1.0" encoding="utf-8"?>
-<p:sld xmlns:a="http://schemas.openxmlformats.org/drawingml/2006/main" xmlns:r="http://schemas.openxmlformats.org/officeDocument/2006/relationships" xmlns:p="http://schemas.openxmlformats.org/presentationml/2006/main">
-  <p:cSld>
-    <p:spTree>
-      <p:nvGrpSpPr>
-        <p:cNvPr id="1" name=""/>
-        <p:cNvGrpSpPr/>
-        <p:nvPr/>
-      </p:nvGrpSpPr>
-      <p:grpSpPr>
-        <a:xfrm>
-          <a:off x="0" y="0"/>
-          <a:ext cx="0" cy="0"/>
-          <a:chOff x="0" y="0"/>
-          <a:chExt cx="0" cy="0"/>
-        </a:xfrm>
-      </p:grpSpPr>
-      <p:pic>
-        <p:nvPicPr>
-          <p:cNvPr id="3076" name="Picture 4">
-            <a:extLst>
-              <a:ext uri="{FF2B5EF4-FFF2-40B4-BE49-F238E27FC236}">
-                <a16:creationId xmlns:a16="http://schemas.microsoft.com/office/drawing/2014/main" id="{EBAEC21B-BD08-48B1-8DD7-F8B99A8E6DD1}"/>
-              </a:ext>
-            </a:extLst>
-          </p:cNvPr>
-          <p:cNvPicPr>
-            <a:picLocks noChangeAspect="1" noChangeArrowheads="1"/>
-          </p:cNvPicPr>
-          <p:nvPr/>
-        </p:nvPicPr>
-        <p:blipFill>
-          <a:blip r:embed="rId2">
-            <a:extLst>
-              <a:ext uri="{BEBA8EAE-BF5A-486C-A8C5-ECC9F3942E4B}">
-                <a14:imgProps xmlns:a14="http://schemas.microsoft.com/office/drawing/2010/main">
-                  <a14:imgLayer r:embed="rId3">
-                    <a14:imgEffect>
-                      <a14:brightnessContrast bright="-40000" contrast="20000"/>
-                    </a14:imgEffect>
-                  </a14:imgLayer>
-                </a14:imgProps>
-              </a:ext>
-              <a:ext uri="{28A0092B-C50C-407E-A947-70E740481C1C}">
-                <a14:useLocalDpi xmlns:a14="http://schemas.microsoft.com/office/drawing/2010/main" val="0"/>
-              </a:ext>
-            </a:extLst>
-          </a:blip>
-          <a:srcRect/>
-          <a:stretch>
-            <a:fillRect/>
-          </a:stretch>
-        </p:blipFill>
-        <p:spPr bwMode="auto">
-          <a:xfrm>
-            <a:off x="0" y="0"/>
-            <a:ext cx="12192000" cy="8132064"/>
-          </a:xfrm>
-          <a:prstGeom prst="rect">
-            <a:avLst/>
-          </a:prstGeom>
-          <a:noFill/>
-          <a:extLst>
-            <a:ext uri="{909E8E84-426E-40DD-AFC4-6F175D3DCCD1}">
-              <a14:hiddenFill xmlns:a14="http://schemas.microsoft.com/office/drawing/2010/main">
-                <a:solidFill>
-                  <a:srgbClr val="FFFFFF"/>
-                </a:solidFill>
-              </a14:hiddenFill>
-            </a:ext>
-          </a:extLst>
-        </p:spPr>
-      </p:pic>
-      <p:sp>
-        <p:nvSpPr>
-          <p:cNvPr id="71" name="Title 1">
-            <a:extLst>
-              <a:ext uri="{FF2B5EF4-FFF2-40B4-BE49-F238E27FC236}">
-                <a16:creationId xmlns:a16="http://schemas.microsoft.com/office/drawing/2014/main" id="{729B91E8-5F5D-4E4F-B4C3-4ECC5D4EBE6B}"/>
-              </a:ext>
-            </a:extLst>
-          </p:cNvPr>
-          <p:cNvSpPr>
-            <a:spLocks noGrp="1"/>
-          </p:cNvSpPr>
-          <p:nvPr>
-            <p:ph type="title"/>
-          </p:nvPr>
-        </p:nvSpPr>
-        <p:spPr>
-          <a:xfrm>
-            <a:off x="1620520" y="2235200"/>
-            <a:ext cx="8950960" cy="1654137"/>
-          </a:xfrm>
-        </p:spPr>
-        <p:txBody>
-          <a:bodyPr anchor="t">
-            <a:noAutofit/>
-          </a:bodyPr>
-          <a:lstStyle/>
-          <a:p>
-            <a:pPr algn="ctr"/>
-            <a:r>
-              <a:rPr lang="it-IT" sz="17900" b="1" dirty="0">
-                <a:solidFill>
-                  <a:schemeClr val="bg1"/>
-                </a:solidFill>
-                <a:cs typeface="Aharoni" panose="02010803020104030203" pitchFamily="2" charset="-79"/>
-              </a:rPr>
-              <a:t>Demo</a:t>
-            </a:r>
-            <a:endParaRPr lang="en-US" sz="17900" b="1" dirty="0">
-              <a:solidFill>
-                <a:schemeClr val="bg1"/>
-              </a:solidFill>
-              <a:cs typeface="Aharoni" panose="02010803020104030203" pitchFamily="2" charset="-79"/>
-            </a:endParaRPr>
-          </a:p>
-        </p:txBody>
-      </p:sp>
-      <p:sp>
-        <p:nvSpPr>
-          <p:cNvPr id="5" name="Date Placeholder 4">
-            <a:extLst>
-              <a:ext uri="{FF2B5EF4-FFF2-40B4-BE49-F238E27FC236}">
-                <a16:creationId xmlns:a16="http://schemas.microsoft.com/office/drawing/2014/main" id="{5763E547-66FF-8D41-A445-B9D23F2D3AC3}"/>
-              </a:ext>
-            </a:extLst>
-          </p:cNvPr>
-          <p:cNvSpPr>
-            <a:spLocks noGrp="1"/>
-          </p:cNvSpPr>
-          <p:nvPr>
-            <p:ph type="dt" sz="half" idx="10"/>
-          </p:nvPr>
-        </p:nvSpPr>
-        <p:spPr>
-          <a:xfrm>
-            <a:off x="838200" y="6356350"/>
-            <a:ext cx="2743200" cy="365125"/>
-          </a:xfrm>
-        </p:spPr>
-        <p:txBody>
-          <a:bodyPr>
-            <a:normAutofit/>
-          </a:bodyPr>
-          <a:lstStyle/>
-          <a:p>
-            <a:pPr>
-              <a:lnSpc>
-                <a:spcPct val="90000"/>
-              </a:lnSpc>
-              <a:spcAft>
-                <a:spcPts val="600"/>
-              </a:spcAft>
-            </a:pPr>
-            <a:fld id="{BF92DA42-2970-1B4D-9C1F-77F249CD7467}" type="datetime1">
-              <a:rPr lang="en-CA" smtClean="0"/>
-              <a:pPr>
-                <a:lnSpc>
-                  <a:spcPct val="90000"/>
-                </a:lnSpc>
-                <a:spcAft>
-                  <a:spcPts val="600"/>
-                </a:spcAft>
-              </a:pPr>
-              <a:t>2020-07-22</a:t>
+              <a:t>2020-09-02</a:t>
             </a:fld>
             <a:endParaRPr lang="en-US"/>
           </a:p>
@@ -6842,10 +6977,159 @@
       </p:sp>
       <p:pic>
         <p:nvPicPr>
-          <p:cNvPr id="8" name="Immagine 7" descr="Immagine che contiene disegnando, segnale, maglietta&#10;&#10;Descrizione generata automaticamente">
-            <a:extLst>
-              <a:ext uri="{FF2B5EF4-FFF2-40B4-BE49-F238E27FC236}">
-                <a16:creationId xmlns:a16="http://schemas.microsoft.com/office/drawing/2014/main" id="{37F7D5C9-F548-427E-8A5A-7B125AAC114E}"/>
+          <p:cNvPr id="2050" name="Picture 2">
+            <a:extLst>
+              <a:ext uri="{FF2B5EF4-FFF2-40B4-BE49-F238E27FC236}">
+                <a16:creationId xmlns:a16="http://schemas.microsoft.com/office/drawing/2014/main" id="{2D8E9E76-629C-4AF6-B244-72D5708C72B8}"/>
+              </a:ext>
+            </a:extLst>
+          </p:cNvPr>
+          <p:cNvPicPr>
+            <a:picLocks noChangeAspect="1" noChangeArrowheads="1"/>
+          </p:cNvPicPr>
+          <p:nvPr/>
+        </p:nvPicPr>
+        <p:blipFill>
+          <a:blip r:embed="rId2">
+            <a:extLst>
+              <a:ext uri="{28A0092B-C50C-407E-A947-70E740481C1C}">
+                <a14:useLocalDpi xmlns:a14="http://schemas.microsoft.com/office/drawing/2010/main" val="0"/>
+              </a:ext>
+            </a:extLst>
+          </a:blip>
+          <a:srcRect/>
+          <a:stretch>
+            <a:fillRect/>
+          </a:stretch>
+        </p:blipFill>
+        <p:spPr bwMode="auto">
+          <a:xfrm>
+            <a:off x="279400" y="360289"/>
+            <a:ext cx="640080" cy="640080"/>
+          </a:xfrm>
+          <a:prstGeom prst="rect">
+            <a:avLst/>
+          </a:prstGeom>
+          <a:noFill/>
+          <a:extLst>
+            <a:ext uri="{909E8E84-426E-40DD-AFC4-6F175D3DCCD1}">
+              <a14:hiddenFill xmlns:a14="http://schemas.microsoft.com/office/drawing/2010/main">
+                <a:solidFill>
+                  <a:srgbClr val="FFFFFF"/>
+                </a:solidFill>
+              </a14:hiddenFill>
+            </a:ext>
+          </a:extLst>
+        </p:spPr>
+      </p:pic>
+      <p:sp>
+        <p:nvSpPr>
+          <p:cNvPr id="2" name="CasellaDiTesto 1">
+            <a:extLst>
+              <a:ext uri="{FF2B5EF4-FFF2-40B4-BE49-F238E27FC236}">
+                <a16:creationId xmlns:a16="http://schemas.microsoft.com/office/drawing/2014/main" id="{0596875C-9F75-4573-A332-2EF7D921E2B0}"/>
+              </a:ext>
+            </a:extLst>
+          </p:cNvPr>
+          <p:cNvSpPr txBox="1"/>
+          <p:nvPr/>
+        </p:nvSpPr>
+        <p:spPr>
+          <a:xfrm>
+            <a:off x="675640" y="2684495"/>
+            <a:ext cx="4851400" cy="1200329"/>
+          </a:xfrm>
+          <a:prstGeom prst="rect">
+            <a:avLst/>
+          </a:prstGeom>
+          <a:noFill/>
+        </p:spPr>
+        <p:txBody>
+          <a:bodyPr wrap="square" rtlCol="0">
+            <a:spAutoFit/>
+          </a:bodyPr>
+          <a:lstStyle/>
+          <a:p>
+            <a:r>
+              <a:rPr lang="en-US" sz="2400" dirty="0">
+                <a:solidFill>
+                  <a:schemeClr val="bg1"/>
+                </a:solidFill>
+              </a:rPr>
+              <a:t>Bare minimal </a:t>
+            </a:r>
+            <a:r>
+              <a:rPr lang="en-US" sz="2400" dirty="0" err="1">
+                <a:solidFill>
+                  <a:schemeClr val="bg1"/>
+                </a:solidFill>
+              </a:rPr>
+              <a:t>vscode</a:t>
+            </a:r>
+            <a:r>
+              <a:rPr lang="en-US" sz="2400" dirty="0">
+                <a:solidFill>
+                  <a:schemeClr val="bg1"/>
+                </a:solidFill>
+              </a:rPr>
+              <a:t> extension that adds code snippets for Thing Description files and validation.</a:t>
+            </a:r>
+          </a:p>
+        </p:txBody>
+      </p:sp>
+      <p:pic>
+        <p:nvPicPr>
+          <p:cNvPr id="2052" name="Picture 4" descr="code completion">
+            <a:extLst>
+              <a:ext uri="{FF2B5EF4-FFF2-40B4-BE49-F238E27FC236}">
+                <a16:creationId xmlns:a16="http://schemas.microsoft.com/office/drawing/2014/main" id="{EC6607AD-5411-46B7-B2AF-AB776546E6F5}"/>
+              </a:ext>
+            </a:extLst>
+          </p:cNvPr>
+          <p:cNvPicPr>
+            <a:picLocks noChangeAspect="1" noChangeArrowheads="1" noCrop="1"/>
+          </p:cNvPicPr>
+          <p:nvPr/>
+        </p:nvPicPr>
+        <p:blipFill>
+          <a:blip r:embed="rId3">
+            <a:extLst>
+              <a:ext uri="{28A0092B-C50C-407E-A947-70E740481C1C}">
+                <a14:useLocalDpi xmlns:a14="http://schemas.microsoft.com/office/drawing/2010/main" val="0"/>
+              </a:ext>
+            </a:extLst>
+          </a:blip>
+          <a:srcRect/>
+          <a:stretch>
+            <a:fillRect/>
+          </a:stretch>
+        </p:blipFill>
+        <p:spPr bwMode="auto">
+          <a:xfrm>
+            <a:off x="5492801" y="1699049"/>
+            <a:ext cx="6235598" cy="3459902"/>
+          </a:xfrm>
+          <a:prstGeom prst="rect">
+            <a:avLst/>
+          </a:prstGeom>
+          <a:noFill/>
+          <a:extLst>
+            <a:ext uri="{909E8E84-426E-40DD-AFC4-6F175D3DCCD1}">
+              <a14:hiddenFill xmlns:a14="http://schemas.microsoft.com/office/drawing/2010/main">
+                <a:solidFill>
+                  <a:srgbClr val="FFFFFF"/>
+                </a:solidFill>
+              </a14:hiddenFill>
+            </a:ext>
+          </a:extLst>
+        </p:spPr>
+      </p:pic>
+      <p:pic>
+        <p:nvPicPr>
+          <p:cNvPr id="12" name="Immagine 11" descr="Immagine che contiene disegnando, segnale, maglietta&#10;&#10;Descrizione generata automaticamente">
+            <a:extLst>
+              <a:ext uri="{FF2B5EF4-FFF2-40B4-BE49-F238E27FC236}">
+                <a16:creationId xmlns:a16="http://schemas.microsoft.com/office/drawing/2014/main" id="{84027AF7-A772-4918-BEFB-C5983E6D4A7D}"/>
               </a:ext>
             </a:extLst>
           </p:cNvPr>
@@ -6870,109 +7154,28 @@
           </a:prstGeom>
         </p:spPr>
       </p:pic>
-      <p:sp>
-        <p:nvSpPr>
-          <p:cNvPr id="10" name="CasellaDiTesto 9">
-            <a:extLst>
-              <a:ext uri="{FF2B5EF4-FFF2-40B4-BE49-F238E27FC236}">
-                <a16:creationId xmlns:a16="http://schemas.microsoft.com/office/drawing/2014/main" id="{AE43B7A7-5892-4FD8-BD13-48A565397713}"/>
-              </a:ext>
-            </a:extLst>
-          </p:cNvPr>
-          <p:cNvSpPr txBox="1"/>
-          <p:nvPr/>
-        </p:nvSpPr>
-        <p:spPr>
-          <a:xfrm>
-            <a:off x="3017520" y="6631767"/>
-            <a:ext cx="6156960" cy="276999"/>
-          </a:xfrm>
-          <a:prstGeom prst="rect">
-            <a:avLst/>
-          </a:prstGeom>
-          <a:noFill/>
-        </p:spPr>
-        <p:txBody>
-          <a:bodyPr wrap="square" rtlCol="0">
-            <a:spAutoFit/>
-          </a:bodyPr>
-          <a:lstStyle/>
-          <a:p>
-            <a:pPr algn="ctr"/>
-            <a:r>
-              <a:rPr lang="it-IT" sz="1200" dirty="0">
-                <a:solidFill>
-                  <a:schemeClr val="bg1">
-                    <a:lumMod val="65000"/>
-                  </a:schemeClr>
-                </a:solidFill>
-              </a:rPr>
-              <a:t>Photo made by </a:t>
-            </a:r>
-            <a:r>
-              <a:rPr lang="it-IT" sz="1200" dirty="0">
-                <a:solidFill>
-                  <a:schemeClr val="bg1">
-                    <a:lumMod val="65000"/>
-                  </a:schemeClr>
-                </a:solidFill>
-                <a:hlinkClick r:id="rId5">
-                  <a:extLst>
-                    <a:ext uri="{A12FA001-AC4F-418D-AE19-62706E023703}">
-                      <ahyp:hlinkClr xmlns:ahyp="http://schemas.microsoft.com/office/drawing/2018/hyperlinkcolor" val="tx"/>
-                    </a:ext>
-                  </a:extLst>
-                </a:hlinkClick>
-              </a:rPr>
-              <a:t>@_louisreed</a:t>
-            </a:r>
-            <a:r>
-              <a:rPr lang="it-IT" sz="1200" dirty="0">
-                <a:solidFill>
-                  <a:schemeClr val="bg1">
-                    <a:lumMod val="65000"/>
-                  </a:schemeClr>
-                </a:solidFill>
-              </a:rPr>
-              <a:t> on </a:t>
-            </a:r>
-            <a:r>
-              <a:rPr lang="it-IT" sz="1200" dirty="0" err="1">
-                <a:solidFill>
-                  <a:schemeClr val="bg1">
-                    <a:lumMod val="65000"/>
-                  </a:schemeClr>
-                </a:solidFill>
-                <a:hlinkClick r:id="rId6">
-                  <a:extLst>
-                    <a:ext uri="{A12FA001-AC4F-418D-AE19-62706E023703}">
-                      <ahyp:hlinkClr xmlns:ahyp="http://schemas.microsoft.com/office/drawing/2018/hyperlinkcolor" val="tx"/>
-                    </a:ext>
-                  </a:extLst>
-                </a:hlinkClick>
-              </a:rPr>
-              <a:t>Unsplash</a:t>
-            </a:r>
-            <a:endParaRPr lang="en-US" sz="1200" dirty="0">
-              <a:solidFill>
-                <a:schemeClr val="bg1">
-                  <a:lumMod val="65000"/>
-                </a:schemeClr>
-              </a:solidFill>
-            </a:endParaRPr>
-          </a:p>
-        </p:txBody>
-      </p:sp>
     </p:spTree>
     <p:extLst>
       <p:ext uri="{BB962C8B-B14F-4D97-AF65-F5344CB8AC3E}">
-        <p14:creationId xmlns:p14="http://schemas.microsoft.com/office/powerpoint/2010/main" val="1761696694"/>
+        <p14:creationId xmlns:p14="http://schemas.microsoft.com/office/powerpoint/2010/main" val="2205310853"/>
       </p:ext>
     </p:extLst>
   </p:cSld>
   <p:clrMapOvr>
     <a:masterClrMapping/>
   </p:clrMapOvr>
+  <mc:AlternateContent xmlns:mc="http://schemas.openxmlformats.org/markup-compatibility/2006" xmlns:p14="http://schemas.microsoft.com/office/powerpoint/2010/main">
+    <mc:Choice Requires="p14">
+      <p:transition spd="med" p14:dur="700">
+        <p:fade/>
+      </p:transition>
+    </mc:Choice>
+    <mc:Fallback xmlns="">
+      <p:transition spd="med">
+        <p:fade/>
+      </p:transition>
+    </mc:Fallback>
+  </mc:AlternateContent>
 </p:sld>
 </file>
 
@@ -6993,6 +7196,109 @@
           <a:chExt cx="0" cy="0"/>
         </a:xfrm>
       </p:grpSpPr>
+      <p:pic>
+        <p:nvPicPr>
+          <p:cNvPr id="3076" name="Picture 4">
+            <a:extLst>
+              <a:ext uri="{FF2B5EF4-FFF2-40B4-BE49-F238E27FC236}">
+                <a16:creationId xmlns:a16="http://schemas.microsoft.com/office/drawing/2014/main" id="{EBAEC21B-BD08-48B1-8DD7-F8B99A8E6DD1}"/>
+              </a:ext>
+            </a:extLst>
+          </p:cNvPr>
+          <p:cNvPicPr>
+            <a:picLocks noChangeAspect="1" noChangeArrowheads="1"/>
+          </p:cNvPicPr>
+          <p:nvPr/>
+        </p:nvPicPr>
+        <p:blipFill>
+          <a:blip r:embed="rId2">
+            <a:extLst>
+              <a:ext uri="{BEBA8EAE-BF5A-486C-A8C5-ECC9F3942E4B}">
+                <a14:imgProps xmlns:a14="http://schemas.microsoft.com/office/drawing/2010/main">
+                  <a14:imgLayer r:embed="rId3">
+                    <a14:imgEffect>
+                      <a14:brightnessContrast bright="-40000" contrast="20000"/>
+                    </a14:imgEffect>
+                  </a14:imgLayer>
+                </a14:imgProps>
+              </a:ext>
+              <a:ext uri="{28A0092B-C50C-407E-A947-70E740481C1C}">
+                <a14:useLocalDpi xmlns:a14="http://schemas.microsoft.com/office/drawing/2010/main" val="0"/>
+              </a:ext>
+            </a:extLst>
+          </a:blip>
+          <a:srcRect/>
+          <a:stretch>
+            <a:fillRect/>
+          </a:stretch>
+        </p:blipFill>
+        <p:spPr bwMode="auto">
+          <a:xfrm>
+            <a:off x="0" y="0"/>
+            <a:ext cx="12192000" cy="8132064"/>
+          </a:xfrm>
+          <a:prstGeom prst="rect">
+            <a:avLst/>
+          </a:prstGeom>
+          <a:noFill/>
+          <a:extLst>
+            <a:ext uri="{909E8E84-426E-40DD-AFC4-6F175D3DCCD1}">
+              <a14:hiddenFill xmlns:a14="http://schemas.microsoft.com/office/drawing/2010/main">
+                <a:solidFill>
+                  <a:srgbClr val="FFFFFF"/>
+                </a:solidFill>
+              </a14:hiddenFill>
+            </a:ext>
+          </a:extLst>
+        </p:spPr>
+      </p:pic>
+      <p:sp>
+        <p:nvSpPr>
+          <p:cNvPr id="71" name="Title 1">
+            <a:extLst>
+              <a:ext uri="{FF2B5EF4-FFF2-40B4-BE49-F238E27FC236}">
+                <a16:creationId xmlns:a16="http://schemas.microsoft.com/office/drawing/2014/main" id="{729B91E8-5F5D-4E4F-B4C3-4ECC5D4EBE6B}"/>
+              </a:ext>
+            </a:extLst>
+          </p:cNvPr>
+          <p:cNvSpPr>
+            <a:spLocks noGrp="1"/>
+          </p:cNvSpPr>
+          <p:nvPr>
+            <p:ph type="title"/>
+          </p:nvPr>
+        </p:nvSpPr>
+        <p:spPr>
+          <a:xfrm>
+            <a:off x="1620520" y="2235200"/>
+            <a:ext cx="8950960" cy="1654137"/>
+          </a:xfrm>
+        </p:spPr>
+        <p:txBody>
+          <a:bodyPr anchor="t">
+            <a:noAutofit/>
+          </a:bodyPr>
+          <a:lstStyle/>
+          <a:p>
+            <a:pPr algn="ctr"/>
+            <a:r>
+              <a:rPr lang="it-IT" sz="17900" b="1" dirty="0">
+                <a:solidFill>
+                  <a:schemeClr val="bg1"/>
+                </a:solidFill>
+                <a:cs typeface="Aharoni" panose="02010803020104030203" pitchFamily="2" charset="-79"/>
+              </a:rPr>
+              <a:t>Demo</a:t>
+            </a:r>
+            <a:endParaRPr lang="en-US" sz="17900" b="1" dirty="0">
+              <a:solidFill>
+                <a:schemeClr val="bg1"/>
+              </a:solidFill>
+              <a:cs typeface="Aharoni" panose="02010803020104030203" pitchFamily="2" charset="-79"/>
+            </a:endParaRPr>
+          </a:p>
+        </p:txBody>
+      </p:sp>
       <p:sp>
         <p:nvSpPr>
           <p:cNvPr id="5" name="Date Placeholder 4">
@@ -7039,7 +7345,7 @@
                   <a:spcPts val="600"/>
                 </a:spcAft>
               </a:pPr>
-              <a:t>2020-07-22</a:t>
+              <a:t>2020-09-02</a:t>
             </a:fld>
             <a:endParaRPr lang="en-US"/>
           </a:p>
@@ -7137,6 +7443,315 @@
           </a:p>
         </p:txBody>
       </p:sp>
+      <p:pic>
+        <p:nvPicPr>
+          <p:cNvPr id="8" name="Immagine 7" descr="Immagine che contiene disegnando, segnale, maglietta&#10;&#10;Descrizione generata automaticamente">
+            <a:extLst>
+              <a:ext uri="{FF2B5EF4-FFF2-40B4-BE49-F238E27FC236}">
+                <a16:creationId xmlns:a16="http://schemas.microsoft.com/office/drawing/2014/main" id="{37F7D5C9-F548-427E-8A5A-7B125AAC114E}"/>
+              </a:ext>
+            </a:extLst>
+          </p:cNvPr>
+          <p:cNvPicPr>
+            <a:picLocks noChangeAspect="1"/>
+          </p:cNvPicPr>
+          <p:nvPr/>
+        </p:nvPicPr>
+        <p:blipFill>
+          <a:blip r:embed="rId4"/>
+          <a:stretch>
+            <a:fillRect/>
+          </a:stretch>
+        </p:blipFill>
+        <p:spPr>
+          <a:xfrm>
+            <a:off x="10764654" y="112395"/>
+            <a:ext cx="1368291" cy="818694"/>
+          </a:xfrm>
+          <a:prstGeom prst="rect">
+            <a:avLst/>
+          </a:prstGeom>
+        </p:spPr>
+      </p:pic>
+      <p:sp>
+        <p:nvSpPr>
+          <p:cNvPr id="10" name="CasellaDiTesto 9">
+            <a:extLst>
+              <a:ext uri="{FF2B5EF4-FFF2-40B4-BE49-F238E27FC236}">
+                <a16:creationId xmlns:a16="http://schemas.microsoft.com/office/drawing/2014/main" id="{AE43B7A7-5892-4FD8-BD13-48A565397713}"/>
+              </a:ext>
+            </a:extLst>
+          </p:cNvPr>
+          <p:cNvSpPr txBox="1"/>
+          <p:nvPr/>
+        </p:nvSpPr>
+        <p:spPr>
+          <a:xfrm>
+            <a:off x="3017520" y="6631767"/>
+            <a:ext cx="6156960" cy="276999"/>
+          </a:xfrm>
+          <a:prstGeom prst="rect">
+            <a:avLst/>
+          </a:prstGeom>
+          <a:noFill/>
+        </p:spPr>
+        <p:txBody>
+          <a:bodyPr wrap="square" rtlCol="0">
+            <a:spAutoFit/>
+          </a:bodyPr>
+          <a:lstStyle/>
+          <a:p>
+            <a:pPr algn="ctr"/>
+            <a:r>
+              <a:rPr lang="it-IT" sz="1200" dirty="0">
+                <a:solidFill>
+                  <a:schemeClr val="bg1">
+                    <a:lumMod val="65000"/>
+                  </a:schemeClr>
+                </a:solidFill>
+              </a:rPr>
+              <a:t>Photo made by </a:t>
+            </a:r>
+            <a:r>
+              <a:rPr lang="it-IT" sz="1200" dirty="0">
+                <a:solidFill>
+                  <a:schemeClr val="bg1">
+                    <a:lumMod val="65000"/>
+                  </a:schemeClr>
+                </a:solidFill>
+                <a:hlinkClick r:id="rId5">
+                  <a:extLst>
+                    <a:ext uri="{A12FA001-AC4F-418D-AE19-62706E023703}">
+                      <ahyp:hlinkClr xmlns:ahyp="http://schemas.microsoft.com/office/drawing/2018/hyperlinkcolor" val="tx"/>
+                    </a:ext>
+                  </a:extLst>
+                </a:hlinkClick>
+              </a:rPr>
+              <a:t>@_louisreed</a:t>
+            </a:r>
+            <a:r>
+              <a:rPr lang="it-IT" sz="1200" dirty="0">
+                <a:solidFill>
+                  <a:schemeClr val="bg1">
+                    <a:lumMod val="65000"/>
+                  </a:schemeClr>
+                </a:solidFill>
+              </a:rPr>
+              <a:t> on </a:t>
+            </a:r>
+            <a:r>
+              <a:rPr lang="it-IT" sz="1200" dirty="0" err="1">
+                <a:solidFill>
+                  <a:schemeClr val="bg1">
+                    <a:lumMod val="65000"/>
+                  </a:schemeClr>
+                </a:solidFill>
+                <a:hlinkClick r:id="rId6">
+                  <a:extLst>
+                    <a:ext uri="{A12FA001-AC4F-418D-AE19-62706E023703}">
+                      <ahyp:hlinkClr xmlns:ahyp="http://schemas.microsoft.com/office/drawing/2018/hyperlinkcolor" val="tx"/>
+                    </a:ext>
+                  </a:extLst>
+                </a:hlinkClick>
+              </a:rPr>
+              <a:t>Unsplash</a:t>
+            </a:r>
+            <a:endParaRPr lang="en-US" sz="1200" dirty="0">
+              <a:solidFill>
+                <a:schemeClr val="bg1">
+                  <a:lumMod val="65000"/>
+                </a:schemeClr>
+              </a:solidFill>
+            </a:endParaRPr>
+          </a:p>
+        </p:txBody>
+      </p:sp>
+    </p:spTree>
+    <p:extLst>
+      <p:ext uri="{BB962C8B-B14F-4D97-AF65-F5344CB8AC3E}">
+        <p14:creationId xmlns:p14="http://schemas.microsoft.com/office/powerpoint/2010/main" val="1761696694"/>
+      </p:ext>
+    </p:extLst>
+  </p:cSld>
+  <p:clrMapOvr>
+    <a:masterClrMapping/>
+  </p:clrMapOvr>
+  <mc:AlternateContent xmlns:mc="http://schemas.openxmlformats.org/markup-compatibility/2006" xmlns:p14="http://schemas.microsoft.com/office/powerpoint/2010/main">
+    <mc:Choice Requires="p14">
+      <p:transition spd="med" p14:dur="700">
+        <p:fade/>
+      </p:transition>
+    </mc:Choice>
+    <mc:Fallback xmlns="">
+      <p:transition spd="med">
+        <p:fade/>
+      </p:transition>
+    </mc:Fallback>
+  </mc:AlternateContent>
+</p:sld>
+</file>
+
+<file path=ppt/slides/slide8.xml><?xml version="1.0" encoding="utf-8"?>
+<p:sld xmlns:a="http://schemas.openxmlformats.org/drawingml/2006/main" xmlns:r="http://schemas.openxmlformats.org/officeDocument/2006/relationships" xmlns:p="http://schemas.openxmlformats.org/presentationml/2006/main" show="0">
+  <p:cSld>
+    <p:spTree>
+      <p:nvGrpSpPr>
+        <p:cNvPr id="1" name=""/>
+        <p:cNvGrpSpPr/>
+        <p:nvPr/>
+      </p:nvGrpSpPr>
+      <p:grpSpPr>
+        <a:xfrm>
+          <a:off x="0" y="0"/>
+          <a:ext cx="0" cy="0"/>
+          <a:chOff x="0" y="0"/>
+          <a:chExt cx="0" cy="0"/>
+        </a:xfrm>
+      </p:grpSpPr>
+      <p:sp>
+        <p:nvSpPr>
+          <p:cNvPr id="5" name="Date Placeholder 4">
+            <a:extLst>
+              <a:ext uri="{FF2B5EF4-FFF2-40B4-BE49-F238E27FC236}">
+                <a16:creationId xmlns:a16="http://schemas.microsoft.com/office/drawing/2014/main" id="{5763E547-66FF-8D41-A445-B9D23F2D3AC3}"/>
+              </a:ext>
+            </a:extLst>
+          </p:cNvPr>
+          <p:cNvSpPr>
+            <a:spLocks noGrp="1"/>
+          </p:cNvSpPr>
+          <p:nvPr>
+            <p:ph type="dt" sz="half" idx="10"/>
+          </p:nvPr>
+        </p:nvSpPr>
+        <p:spPr>
+          <a:xfrm>
+            <a:off x="838200" y="6356350"/>
+            <a:ext cx="2743200" cy="365125"/>
+          </a:xfrm>
+        </p:spPr>
+        <p:txBody>
+          <a:bodyPr>
+            <a:normAutofit/>
+          </a:bodyPr>
+          <a:lstStyle/>
+          <a:p>
+            <a:pPr>
+              <a:lnSpc>
+                <a:spcPct val="90000"/>
+              </a:lnSpc>
+              <a:spcAft>
+                <a:spcPts val="600"/>
+              </a:spcAft>
+            </a:pPr>
+            <a:fld id="{BF92DA42-2970-1B4D-9C1F-77F249CD7467}" type="datetime1">
+              <a:rPr lang="en-CA" smtClean="0"/>
+              <a:pPr>
+                <a:lnSpc>
+                  <a:spcPct val="90000"/>
+                </a:lnSpc>
+                <a:spcAft>
+                  <a:spcPts val="600"/>
+                </a:spcAft>
+              </a:pPr>
+              <a:t>2020-09-02</a:t>
+            </a:fld>
+            <a:endParaRPr lang="en-US"/>
+          </a:p>
+        </p:txBody>
+      </p:sp>
+      <p:sp>
+        <p:nvSpPr>
+          <p:cNvPr id="6" name="Footer Placeholder 5">
+            <a:extLst>
+              <a:ext uri="{FF2B5EF4-FFF2-40B4-BE49-F238E27FC236}">
+                <a16:creationId xmlns:a16="http://schemas.microsoft.com/office/drawing/2014/main" id="{C403CDDC-3456-C849-BC93-92466B8AD9BE}"/>
+              </a:ext>
+            </a:extLst>
+          </p:cNvPr>
+          <p:cNvSpPr>
+            <a:spLocks noGrp="1"/>
+          </p:cNvSpPr>
+          <p:nvPr>
+            <p:ph type="ftr" sz="quarter" idx="11"/>
+          </p:nvPr>
+        </p:nvSpPr>
+        <p:spPr>
+          <a:xfrm>
+            <a:off x="4038600" y="6356350"/>
+            <a:ext cx="4114800" cy="365125"/>
+          </a:xfrm>
+        </p:spPr>
+        <p:txBody>
+          <a:bodyPr anchor="ctr">
+            <a:normAutofit/>
+          </a:bodyPr>
+          <a:lstStyle/>
+          <a:p>
+            <a:pPr>
+              <a:spcAft>
+                <a:spcPts val="600"/>
+              </a:spcAft>
+            </a:pPr>
+            <a:r>
+              <a:rPr lang="en-US"/>
+              <a:t>W3C Web of Things (WoT) WG/IG</a:t>
+            </a:r>
+          </a:p>
+        </p:txBody>
+      </p:sp>
+      <p:sp>
+        <p:nvSpPr>
+          <p:cNvPr id="7" name="Slide Number Placeholder 6">
+            <a:extLst>
+              <a:ext uri="{FF2B5EF4-FFF2-40B4-BE49-F238E27FC236}">
+                <a16:creationId xmlns:a16="http://schemas.microsoft.com/office/drawing/2014/main" id="{B2AB2D99-10F9-7144-B8A4-C7301A569FCB}"/>
+              </a:ext>
+            </a:extLst>
+          </p:cNvPr>
+          <p:cNvSpPr>
+            <a:spLocks noGrp="1"/>
+          </p:cNvSpPr>
+          <p:nvPr>
+            <p:ph type="sldNum" sz="quarter" idx="12"/>
+          </p:nvPr>
+        </p:nvSpPr>
+        <p:spPr>
+          <a:xfrm>
+            <a:off x="8610600" y="6356350"/>
+            <a:ext cx="2743200" cy="365125"/>
+          </a:xfrm>
+        </p:spPr>
+        <p:txBody>
+          <a:bodyPr>
+            <a:normAutofit/>
+          </a:bodyPr>
+          <a:lstStyle/>
+          <a:p>
+            <a:pPr>
+              <a:lnSpc>
+                <a:spcPct val="90000"/>
+              </a:lnSpc>
+              <a:spcAft>
+                <a:spcPts val="600"/>
+              </a:spcAft>
+            </a:pPr>
+            <a:fld id="{055BDE2E-7167-1944-9FEE-E44668D91CB6}" type="slidenum">
+              <a:rPr lang="en-US" smtClean="0"/>
+              <a:pPr>
+                <a:lnSpc>
+                  <a:spcPct val="90000"/>
+                </a:lnSpc>
+                <a:spcAft>
+                  <a:spcPts val="600"/>
+                </a:spcAft>
+              </a:pPr>
+              <a:t>8</a:t>
+            </a:fld>
+            <a:endParaRPr lang="en-US"/>
+          </a:p>
+        </p:txBody>
+      </p:sp>
       <p:sp>
         <p:nvSpPr>
           <p:cNvPr id="3" name="Titolo 2">
@@ -7230,6 +7845,154 @@
     <p:extLst>
       <p:ext uri="{BB962C8B-B14F-4D97-AF65-F5344CB8AC3E}">
         <p14:creationId xmlns:p14="http://schemas.microsoft.com/office/powerpoint/2010/main" val="3572860073"/>
+      </p:ext>
+    </p:extLst>
+  </p:cSld>
+  <p:clrMapOvr>
+    <a:masterClrMapping/>
+  </p:clrMapOvr>
+</p:sld>
+</file>
+
+<file path=ppt/slides/slide9.xml><?xml version="1.0" encoding="utf-8"?>
+<p:sld xmlns:a="http://schemas.openxmlformats.org/drawingml/2006/main" xmlns:r="http://schemas.openxmlformats.org/officeDocument/2006/relationships" xmlns:p="http://schemas.openxmlformats.org/presentationml/2006/main" show="0">
+  <p:cSld>
+    <p:spTree>
+      <p:nvGrpSpPr>
+        <p:cNvPr id="1" name=""/>
+        <p:cNvGrpSpPr/>
+        <p:nvPr/>
+      </p:nvGrpSpPr>
+      <p:grpSpPr>
+        <a:xfrm>
+          <a:off x="0" y="0"/>
+          <a:ext cx="0" cy="0"/>
+          <a:chOff x="0" y="0"/>
+          <a:chExt cx="0" cy="0"/>
+        </a:xfrm>
+      </p:grpSpPr>
+      <p:sp>
+        <p:nvSpPr>
+          <p:cNvPr id="2" name="Title 1">
+            <a:extLst>
+              <a:ext uri="{FF2B5EF4-FFF2-40B4-BE49-F238E27FC236}">
+                <a16:creationId xmlns:a16="http://schemas.microsoft.com/office/drawing/2014/main" id="{F0887674-345B-6D45-8433-396169D87CDD}"/>
+              </a:ext>
+            </a:extLst>
+          </p:cNvPr>
+          <p:cNvSpPr>
+            <a:spLocks noGrp="1"/>
+          </p:cNvSpPr>
+          <p:nvPr>
+            <p:ph type="ctrTitle"/>
+          </p:nvPr>
+        </p:nvSpPr>
+        <p:spPr>
+          <a:xfrm>
+            <a:off x="757561" y="3418321"/>
+            <a:ext cx="10676878" cy="1413946"/>
+          </a:xfrm>
+        </p:spPr>
+        <p:txBody>
+          <a:bodyPr>
+            <a:normAutofit fontScale="90000"/>
+          </a:bodyPr>
+          <a:lstStyle/>
+          <a:p>
+            <a:r>
+              <a:rPr lang="it-IT" dirty="0"/>
+              <a:t>Building a Web of </a:t>
+            </a:r>
+            <a:r>
+              <a:rPr lang="it-IT" dirty="0" err="1"/>
+              <a:t>Things</a:t>
+            </a:r>
+            <a:r>
+              <a:rPr lang="it-IT" dirty="0"/>
+              <a:t> </a:t>
+            </a:r>
+            <a:r>
+              <a:rPr lang="it-IT" dirty="0" err="1"/>
+              <a:t>application</a:t>
+            </a:r>
+            <a:endParaRPr lang="en-US" dirty="0"/>
+          </a:p>
+        </p:txBody>
+      </p:sp>
+      <p:sp>
+        <p:nvSpPr>
+          <p:cNvPr id="3" name="Subtitle 2">
+            <a:extLst>
+              <a:ext uri="{FF2B5EF4-FFF2-40B4-BE49-F238E27FC236}">
+                <a16:creationId xmlns:a16="http://schemas.microsoft.com/office/drawing/2014/main" id="{C0E957DB-7468-C943-8F4B-9FE90A3CB8D2}"/>
+              </a:ext>
+            </a:extLst>
+          </p:cNvPr>
+          <p:cNvSpPr>
+            <a:spLocks noGrp="1"/>
+          </p:cNvSpPr>
+          <p:nvPr>
+            <p:ph type="subTitle" idx="1"/>
+          </p:nvPr>
+        </p:nvSpPr>
+        <p:spPr>
+          <a:xfrm>
+            <a:off x="1523999" y="4707079"/>
+            <a:ext cx="9144000" cy="1179317"/>
+          </a:xfrm>
+        </p:spPr>
+        <p:txBody>
+          <a:bodyPr>
+            <a:normAutofit/>
+          </a:bodyPr>
+          <a:lstStyle/>
+          <a:p>
+            <a:r>
+              <a:rPr lang="en-US" sz="3200" b="1" dirty="0" err="1"/>
+              <a:t>WoT</a:t>
+            </a:r>
+            <a:r>
+              <a:rPr lang="en-US" sz="3200" b="1" dirty="0"/>
+              <a:t> application Manager and TD-code </a:t>
+            </a:r>
+          </a:p>
+          <a:p>
+            <a:endParaRPr lang="en-US" dirty="0"/>
+          </a:p>
+        </p:txBody>
+      </p:sp>
+      <p:sp>
+        <p:nvSpPr>
+          <p:cNvPr id="4" name="Footer Placeholder 3">
+            <a:extLst>
+              <a:ext uri="{FF2B5EF4-FFF2-40B4-BE49-F238E27FC236}">
+                <a16:creationId xmlns:a16="http://schemas.microsoft.com/office/drawing/2014/main" id="{708488F1-92D7-254A-A373-03160DC753D3}"/>
+              </a:ext>
+            </a:extLst>
+          </p:cNvPr>
+          <p:cNvSpPr>
+            <a:spLocks noGrp="1"/>
+          </p:cNvSpPr>
+          <p:nvPr>
+            <p:ph type="ftr" sz="quarter" idx="11"/>
+          </p:nvPr>
+        </p:nvSpPr>
+        <p:spPr/>
+        <p:txBody>
+          <a:bodyPr/>
+          <a:lstStyle/>
+          <a:p>
+            <a:r>
+              <a:rPr lang="en-US"/>
+              <a:t>W3C Web of Things (WoT) WG/IG</a:t>
+            </a:r>
+          </a:p>
+        </p:txBody>
+      </p:sp>
+    </p:spTree>
+    <p:extLst>
+      <p:ext uri="{BB962C8B-B14F-4D97-AF65-F5344CB8AC3E}">
+        <p14:creationId xmlns:p14="http://schemas.microsoft.com/office/powerpoint/2010/main" val="443187222"/>
       </p:ext>
     </p:extLst>
   </p:cSld>

</xml_diff>